<commit_message>
ESA talk and start on conceptual paper
</commit_message>
<xml_diff>
--- a/ESA_2017_extra.pptx
+++ b/ESA_2017_extra.pptx
@@ -5,27 +5,29 @@
     <p:sldMasterId id="2147483648" r:id="rId1"/>
   </p:sldMasterIdLst>
   <p:notesMasterIdLst>
-    <p:notesMasterId r:id="rId20"/>
+    <p:notesMasterId r:id="rId22"/>
   </p:notesMasterIdLst>
   <p:sldIdLst>
     <p:sldId id="256" r:id="rId2"/>
-    <p:sldId id="257" r:id="rId3"/>
-    <p:sldId id="258" r:id="rId4"/>
-    <p:sldId id="259" r:id="rId5"/>
-    <p:sldId id="260" r:id="rId6"/>
-    <p:sldId id="261" r:id="rId7"/>
-    <p:sldId id="262" r:id="rId8"/>
-    <p:sldId id="263" r:id="rId9"/>
-    <p:sldId id="264" r:id="rId10"/>
-    <p:sldId id="265" r:id="rId11"/>
-    <p:sldId id="266" r:id="rId12"/>
-    <p:sldId id="267" r:id="rId13"/>
-    <p:sldId id="268" r:id="rId14"/>
-    <p:sldId id="269" r:id="rId15"/>
-    <p:sldId id="270" r:id="rId16"/>
-    <p:sldId id="271" r:id="rId17"/>
-    <p:sldId id="272" r:id="rId18"/>
-    <p:sldId id="273" r:id="rId19"/>
+    <p:sldId id="274" r:id="rId3"/>
+    <p:sldId id="275" r:id="rId4"/>
+    <p:sldId id="257" r:id="rId5"/>
+    <p:sldId id="258" r:id="rId6"/>
+    <p:sldId id="259" r:id="rId7"/>
+    <p:sldId id="260" r:id="rId8"/>
+    <p:sldId id="261" r:id="rId9"/>
+    <p:sldId id="262" r:id="rId10"/>
+    <p:sldId id="263" r:id="rId11"/>
+    <p:sldId id="264" r:id="rId12"/>
+    <p:sldId id="265" r:id="rId13"/>
+    <p:sldId id="266" r:id="rId14"/>
+    <p:sldId id="267" r:id="rId15"/>
+    <p:sldId id="268" r:id="rId16"/>
+    <p:sldId id="269" r:id="rId17"/>
+    <p:sldId id="270" r:id="rId18"/>
+    <p:sldId id="271" r:id="rId19"/>
+    <p:sldId id="272" r:id="rId20"/>
+    <p:sldId id="273" r:id="rId21"/>
   </p:sldIdLst>
   <p:sldSz cx="9144000" cy="6858000" type="screen4x3"/>
   <p:notesSz cx="6858000" cy="9144000"/>
@@ -209,7 +211,7 @@
           <a:p>
             <a:fld id="{4E755CB7-3399-5041-BF15-1A22DCC4426A}" type="datetimeFigureOut">
               <a:rPr lang="en-US" smtClean="0"/>
-              <a:t>17-08-09</a:t>
+              <a:t>17-08-10</a:t>
             </a:fld>
             <a:endParaRPr lang="en-US"/>
           </a:p>
@@ -522,7 +524,20 @@
           <a:lstStyle/>
           <a:p>
             <a:r>
-              <a:rPr lang="en-US" sz="1200" b="0" i="0" u="none" strike="noStrike" kern="1200" baseline="0" dirty="0" smtClean="0">
+              <a:rPr lang="en-US" dirty="0" smtClean="0"/>
+              <a:t>Neither</a:t>
+            </a:r>
+            <a:r>
+              <a:rPr lang="en-US" baseline="0" dirty="0" smtClean="0"/>
+              <a:t> linear nor quadratic a good fit</a:t>
+            </a:r>
+          </a:p>
+          <a:p>
+            <a:endParaRPr lang="en-US" baseline="0" dirty="0" smtClean="0"/>
+          </a:p>
+          <a:p>
+            <a:r>
+              <a:rPr lang="en-US" sz="1200" kern="1200" dirty="0" smtClean="0">
                 <a:solidFill>
                   <a:schemeClr val="tx1"/>
                 </a:solidFill>
@@ -530,33 +545,45 @@
                 <a:ea typeface="+mn-ea"/>
                 <a:cs typeface="+mn-cs"/>
               </a:rPr>
-              <a:t>While there is no doubt that a changing climate induces differences</a:t>
-            </a:r>
-          </a:p>
-          <a:p>
-            <a:r>
-              <a:rPr lang="en-US" sz="1200" b="0" i="0" u="none" strike="noStrike" kern="1200" baseline="0" dirty="0" smtClean="0">
-                <a:solidFill>
-                  <a:schemeClr val="tx1"/>
-                </a:solidFill>
-                <a:latin typeface="+mn-lt"/>
-                <a:ea typeface="+mn-ea"/>
-                <a:cs typeface="+mn-cs"/>
-              </a:rPr>
-              <a:t>in the timing of predators and prey, the ecological ramifications</a:t>
-            </a:r>
-          </a:p>
-          <a:p>
-            <a:r>
-              <a:rPr lang="en-US" sz="1200" b="0" i="0" u="none" strike="noStrike" kern="1200" baseline="0" dirty="0" smtClean="0">
-                <a:solidFill>
-                  <a:schemeClr val="tx1"/>
-                </a:solidFill>
-                <a:latin typeface="+mn-lt"/>
-                <a:ea typeface="+mn-ea"/>
-                <a:cs typeface="+mn-cs"/>
-              </a:rPr>
-              <a:t>of this are far from clear.</a:t>
+              <a:t>Relationship between fitness and synchrony varies across systems-</a:t>
+            </a:r>
+          </a:p>
+          <a:p>
+            <a:endParaRPr lang="en-US" sz="1200" kern="1200" baseline="0" dirty="0" smtClean="0">
+              <a:solidFill>
+                <a:schemeClr val="tx1"/>
+              </a:solidFill>
+              <a:latin typeface="+mn-lt"/>
+              <a:ea typeface="+mn-ea"/>
+              <a:cs typeface="+mn-cs"/>
+            </a:endParaRPr>
+          </a:p>
+          <a:p>
+            <a:r>
+              <a:rPr lang="en-US" dirty="0" smtClean="0"/>
+              <a:t>Therefore Support for the hypothesis</a:t>
+            </a:r>
+          </a:p>
+          <a:p>
+            <a:r>
+              <a:rPr lang="en-US" dirty="0" smtClean="0"/>
+              <a:t>BUT Difficult to predict context for consequences of mismatch</a:t>
+            </a:r>
+          </a:p>
+          <a:p>
+            <a:endParaRPr lang="en-US" baseline="0" dirty="0" smtClean="0"/>
+          </a:p>
+          <a:p>
+            <a:endParaRPr lang="en-US" baseline="0" dirty="0" smtClean="0"/>
+          </a:p>
+          <a:p>
+            <a:r>
+              <a:rPr lang="en-US" baseline="0" dirty="0" smtClean="0"/>
+              <a:t>Could be no relationship overall because weak effect across the board (majority of slopes ~0) OR variation in the direction of response- some positive, some </a:t>
+            </a:r>
+            <a:r>
+              <a:rPr lang="en-US" baseline="0" dirty="0" err="1" smtClean="0"/>
+              <a:t>negatove</a:t>
             </a:r>
             <a:endParaRPr lang="en-US" dirty="0"/>
           </a:p>
@@ -579,7 +606,7 @@
           <a:p>
             <a:fld id="{EE767C92-0ACB-CC40-88B6-2B4628F13609}" type="slidenum">
               <a:rPr lang="en-US" smtClean="0"/>
-              <a:t>5</a:t>
+              <a:t>2</a:t>
             </a:fld>
             <a:endParaRPr lang="en-US"/>
           </a:p>
@@ -588,7 +615,7 @@
     </p:spTree>
     <p:extLst>
       <p:ext uri="{BB962C8B-B14F-4D97-AF65-F5344CB8AC3E}">
-        <p14:creationId xmlns:p14="http://schemas.microsoft.com/office/powerpoint/2010/main" val="1481426292"/>
+        <p14:creationId xmlns:p14="http://schemas.microsoft.com/office/powerpoint/2010/main" val="3555600196"/>
       </p:ext>
     </p:extLst>
   </p:cSld>
@@ -639,143 +666,22 @@
         </p:nvSpPr>
         <p:spPr/>
         <p:txBody>
-          <a:bodyPr>
-            <a:normAutofit/>
-          </a:bodyPr>
-          <a:lstStyle/>
-          <a:p>
-            <a:endParaRPr lang="en-US" sz="1200" kern="1200" dirty="0" smtClean="0">
-              <a:solidFill>
-                <a:schemeClr val="tx1"/>
-              </a:solidFill>
-              <a:latin typeface="+mn-lt"/>
-              <a:ea typeface="+mn-ea"/>
-              <a:cs typeface="+mn-cs"/>
-            </a:endParaRPr>
-          </a:p>
-          <a:p>
-            <a:pPr marL="0" marR="0" indent="0" algn="l" defTabSz="457200" rtl="0" eaLnBrk="1" fontAlgn="auto" latinLnBrk="0" hangingPunct="1">
-              <a:lnSpc>
-                <a:spcPct val="100000"/>
-              </a:lnSpc>
-              <a:spcBef>
-                <a:spcPts val="0"/>
-              </a:spcBef>
-              <a:spcAft>
-                <a:spcPts val="0"/>
-              </a:spcAft>
-              <a:buClrTx/>
-              <a:buSzTx/>
-              <a:buFontTx/>
-              <a:buNone/>
-              <a:tabLst/>
-              <a:defRPr/>
-            </a:pPr>
-            <a:r>
-              <a:rPr lang="en-CA" sz="1200" kern="1200" dirty="0" smtClean="0">
-                <a:solidFill>
-                  <a:schemeClr val="tx1"/>
-                </a:solidFill>
-                <a:effectLst/>
-                <a:latin typeface="+mn-lt"/>
-                <a:ea typeface="+mn-ea"/>
-                <a:cs typeface="+mn-cs"/>
-              </a:rPr>
-              <a:t>Due in large part to climate change, the relative timing of species interactions is shifting. The match-mismatch hypothesis (Cushing 1969) predicts that these shifts will lead to fitness consequences because there is selection for consumers and </a:t>
-            </a:r>
-            <a:r>
-              <a:rPr lang="en-CA" sz="1200" kern="1200" dirty="0" err="1" smtClean="0">
-                <a:solidFill>
-                  <a:schemeClr val="tx1"/>
-                </a:solidFill>
-                <a:effectLst/>
-                <a:latin typeface="+mn-lt"/>
-                <a:ea typeface="+mn-ea"/>
-                <a:cs typeface="+mn-cs"/>
-              </a:rPr>
-              <a:t>mutualists</a:t>
-            </a:r>
-            <a:r>
-              <a:rPr lang="en-CA" sz="1200" kern="1200" dirty="0" smtClean="0">
-                <a:solidFill>
-                  <a:schemeClr val="tx1"/>
-                </a:solidFill>
-                <a:effectLst/>
-                <a:latin typeface="+mn-lt"/>
-                <a:ea typeface="+mn-ea"/>
-                <a:cs typeface="+mn-cs"/>
-              </a:rPr>
-              <a:t> to synchronize their phenology to that of their resources to maximize their fitness (‘match’). Therefore, for those species in these roles, we would predict any shift in synchrony to lead to negative fitness consequences (‘mismatch’).</a:t>
-            </a:r>
-            <a:r>
-              <a:rPr lang="en-CA" dirty="0" smtClean="0">
-                <a:effectLst/>
-              </a:rPr>
-              <a:t> </a:t>
-            </a:r>
-          </a:p>
-          <a:p>
-            <a:pPr marL="0" marR="0" indent="0" algn="l" defTabSz="457200" rtl="0" eaLnBrk="1" fontAlgn="auto" latinLnBrk="0" hangingPunct="1">
-              <a:lnSpc>
-                <a:spcPct val="100000"/>
-              </a:lnSpc>
-              <a:spcBef>
-                <a:spcPts val="0"/>
-              </a:spcBef>
-              <a:spcAft>
-                <a:spcPts val="0"/>
-              </a:spcAft>
-              <a:buClrTx/>
-              <a:buSzTx/>
-              <a:buFontTx/>
-              <a:buNone/>
-              <a:tabLst/>
-              <a:defRPr/>
-            </a:pPr>
-            <a:endParaRPr lang="en-CA" dirty="0" smtClean="0">
-              <a:effectLst/>
-            </a:endParaRPr>
-          </a:p>
-          <a:p>
-            <a:pPr marL="0" marR="0" indent="0" algn="l" defTabSz="457200" rtl="0" eaLnBrk="1" fontAlgn="auto" latinLnBrk="0" hangingPunct="1">
-              <a:lnSpc>
-                <a:spcPct val="100000"/>
-              </a:lnSpc>
-              <a:spcBef>
-                <a:spcPts val="0"/>
-              </a:spcBef>
-              <a:spcAft>
-                <a:spcPts val="0"/>
-              </a:spcAft>
-              <a:buClrTx/>
-              <a:buSzTx/>
-              <a:buFontTx/>
-              <a:buNone/>
-              <a:tabLst/>
-              <a:defRPr/>
-            </a:pPr>
-            <a:endParaRPr lang="en-CA" dirty="0" smtClean="0">
-              <a:effectLst/>
-            </a:endParaRPr>
-          </a:p>
-          <a:p>
-            <a:pPr marL="0" marR="0" indent="0" algn="l" defTabSz="457200" rtl="0" eaLnBrk="1" fontAlgn="auto" latinLnBrk="0" hangingPunct="1">
-              <a:lnSpc>
-                <a:spcPct val="100000"/>
-              </a:lnSpc>
-              <a:spcBef>
-                <a:spcPts val="0"/>
-              </a:spcBef>
-              <a:spcAft>
-                <a:spcPts val="0"/>
-              </a:spcAft>
-              <a:buClrTx/>
-              <a:buSzTx/>
-              <a:buFontTx/>
-              <a:buNone/>
-              <a:tabLst/>
-              <a:defRPr/>
-            </a:pPr>
+          <a:bodyPr/>
+          <a:lstStyle/>
+          <a:p>
+            <a:r>
+              <a:rPr lang="en-US" dirty="0" smtClean="0"/>
+              <a:t>Neither</a:t>
+            </a:r>
+            <a:r>
+              <a:rPr lang="en-US" baseline="0" dirty="0" smtClean="0"/>
+              <a:t> linear nor quadratic a good fit</a:t>
+            </a:r>
+          </a:p>
+          <a:p>
+            <a:endParaRPr lang="en-US" baseline="0" dirty="0" smtClean="0"/>
+          </a:p>
+          <a:p>
             <a:r>
               <a:rPr lang="en-US" sz="1200" kern="1200" dirty="0" smtClean="0">
                 <a:solidFill>
@@ -785,31 +691,11 @@
                 <a:ea typeface="+mn-ea"/>
                 <a:cs typeface="+mn-cs"/>
               </a:rPr>
-              <a:t>Shifts in synchrony could lead to temporal changes in species’ performance  if a species’ performance is related to the relative timing of the interaction and there has been a directional change in synchrony over time.  Of course there are many reasons why we wouldn’t expect a relationship- discussion</a:t>
-            </a:r>
-          </a:p>
-          <a:p>
-            <a:pPr marL="0" marR="0" indent="0" algn="l" defTabSz="457200" rtl="0" eaLnBrk="1" fontAlgn="auto" latinLnBrk="0" hangingPunct="1">
-              <a:lnSpc>
-                <a:spcPct val="100000"/>
-              </a:lnSpc>
-              <a:spcBef>
-                <a:spcPts val="0"/>
-              </a:spcBef>
-              <a:spcAft>
-                <a:spcPts val="0"/>
-              </a:spcAft>
-              <a:buClrTx/>
-              <a:buSzTx/>
-              <a:buFontTx/>
-              <a:buNone/>
-              <a:tabLst/>
-              <a:defRPr/>
-            </a:pPr>
-            <a:endParaRPr lang="en-US" dirty="0" smtClean="0"/>
-          </a:p>
-          <a:p>
-            <a:endParaRPr lang="en-US" sz="1200" kern="1200" dirty="0">
+              <a:t>Relationship between fitness and synchrony varies across systems-</a:t>
+            </a:r>
+          </a:p>
+          <a:p>
+            <a:endParaRPr lang="en-US" sz="1200" kern="1200" baseline="0" dirty="0" smtClean="0">
               <a:solidFill>
                 <a:schemeClr val="tx1"/>
               </a:solidFill>
@@ -818,6 +704,35 @@
               <a:cs typeface="+mn-cs"/>
             </a:endParaRPr>
           </a:p>
+          <a:p>
+            <a:r>
+              <a:rPr lang="en-US" dirty="0" smtClean="0"/>
+              <a:t>Therefore Support for the hypothesis</a:t>
+            </a:r>
+          </a:p>
+          <a:p>
+            <a:r>
+              <a:rPr lang="en-US" dirty="0" smtClean="0"/>
+              <a:t>BUT Difficult to predict context for consequences of mismatch</a:t>
+            </a:r>
+          </a:p>
+          <a:p>
+            <a:endParaRPr lang="en-US" baseline="0" dirty="0" smtClean="0"/>
+          </a:p>
+          <a:p>
+            <a:endParaRPr lang="en-US" baseline="0" dirty="0" smtClean="0"/>
+          </a:p>
+          <a:p>
+            <a:r>
+              <a:rPr lang="en-US" baseline="0" dirty="0" smtClean="0"/>
+              <a:t>Could be no relationship overall because weak effect across the board (majority of slopes ~0) OR variation in the direction of response- some positive, some </a:t>
+            </a:r>
+            <a:r>
+              <a:rPr lang="en-US" baseline="0" dirty="0" err="1" smtClean="0"/>
+              <a:t>negatove</a:t>
+            </a:r>
+            <a:endParaRPr lang="en-US" dirty="0"/>
+          </a:p>
         </p:txBody>
       </p:sp>
       <p:sp>
@@ -835,16 +750,20 @@
           <a:bodyPr/>
           <a:lstStyle/>
           <a:p>
-            <a:fld id="{0FA3A654-AFD7-7F49-B777-9BAB2BDE37CD}" type="slidenum">
+            <a:fld id="{EE767C92-0ACB-CC40-88B6-2B4628F13609}" type="slidenum">
               <a:rPr lang="en-US" smtClean="0"/>
-              <a:pPr/>
-              <a:t>7</a:t>
+              <a:t>3</a:t>
             </a:fld>
             <a:endParaRPr lang="en-US"/>
           </a:p>
         </p:txBody>
       </p:sp>
     </p:spTree>
+    <p:extLst>
+      <p:ext uri="{BB962C8B-B14F-4D97-AF65-F5344CB8AC3E}">
+        <p14:creationId xmlns:p14="http://schemas.microsoft.com/office/powerpoint/2010/main" val="3555600196"/>
+      </p:ext>
+    </p:extLst>
   </p:cSld>
   <p:clrMapOvr>
     <a:masterClrMapping/>
@@ -905,7 +824,7 @@
                 <a:ea typeface="+mn-ea"/>
                 <a:cs typeface="+mn-cs"/>
               </a:rPr>
-              <a:t>One potential major impact of climate change is the modification of synchronization</a:t>
+              <a:t>While there is no doubt that a changing climate induces differences</a:t>
             </a:r>
           </a:p>
           <a:p>
@@ -918,7 +837,20 @@
                 <a:ea typeface="+mn-ea"/>
                 <a:cs typeface="+mn-cs"/>
               </a:rPr>
-              <a:t>between the phenology of different trophic levels</a:t>
+              <a:t>in the timing of predators and prey, the ecological ramifications</a:t>
+            </a:r>
+          </a:p>
+          <a:p>
+            <a:r>
+              <a:rPr lang="en-US" sz="1200" b="0" i="0" u="none" strike="noStrike" kern="1200" baseline="0" dirty="0" smtClean="0">
+                <a:solidFill>
+                  <a:schemeClr val="tx1"/>
+                </a:solidFill>
+                <a:latin typeface="+mn-lt"/>
+                <a:ea typeface="+mn-ea"/>
+                <a:cs typeface="+mn-cs"/>
+              </a:rPr>
+              <a:t>of this are far from clear.</a:t>
             </a:r>
             <a:endParaRPr lang="en-US" dirty="0"/>
           </a:p>
@@ -941,7 +873,7 @@
           <a:p>
             <a:fld id="{EE767C92-0ACB-CC40-88B6-2B4628F13609}" type="slidenum">
               <a:rPr lang="en-US" smtClean="0"/>
-              <a:t>13</a:t>
+              <a:t>7</a:t>
             </a:fld>
             <a:endParaRPr lang="en-US"/>
           </a:p>
@@ -950,7 +882,7 @@
     </p:spTree>
     <p:extLst>
       <p:ext uri="{BB962C8B-B14F-4D97-AF65-F5344CB8AC3E}">
-        <p14:creationId xmlns:p14="http://schemas.microsoft.com/office/powerpoint/2010/main" val="3144514670"/>
+        <p14:creationId xmlns:p14="http://schemas.microsoft.com/office/powerpoint/2010/main" val="1481426292"/>
       </p:ext>
     </p:extLst>
   </p:cSld>
@@ -1001,54 +933,212 @@
         </p:nvSpPr>
         <p:spPr/>
         <p:txBody>
+          <a:bodyPr>
+            <a:normAutofit/>
+          </a:bodyPr>
+          <a:lstStyle/>
+          <a:p>
+            <a:endParaRPr lang="en-US" sz="1200" kern="1200" dirty="0" smtClean="0">
+              <a:solidFill>
+                <a:schemeClr val="tx1"/>
+              </a:solidFill>
+              <a:latin typeface="+mn-lt"/>
+              <a:ea typeface="+mn-ea"/>
+              <a:cs typeface="+mn-cs"/>
+            </a:endParaRPr>
+          </a:p>
+          <a:p>
+            <a:pPr marL="0" marR="0" indent="0" algn="l" defTabSz="457200" rtl="0" eaLnBrk="1" fontAlgn="auto" latinLnBrk="0" hangingPunct="1">
+              <a:lnSpc>
+                <a:spcPct val="100000"/>
+              </a:lnSpc>
+              <a:spcBef>
+                <a:spcPts val="0"/>
+              </a:spcBef>
+              <a:spcAft>
+                <a:spcPts val="0"/>
+              </a:spcAft>
+              <a:buClrTx/>
+              <a:buSzTx/>
+              <a:buFontTx/>
+              <a:buNone/>
+              <a:tabLst/>
+              <a:defRPr/>
+            </a:pPr>
+            <a:r>
+              <a:rPr lang="en-CA" sz="1200" kern="1200" dirty="0" smtClean="0">
+                <a:solidFill>
+                  <a:schemeClr val="tx1"/>
+                </a:solidFill>
+                <a:effectLst/>
+                <a:latin typeface="+mn-lt"/>
+                <a:ea typeface="+mn-ea"/>
+                <a:cs typeface="+mn-cs"/>
+              </a:rPr>
+              <a:t>Due in large part to climate change, the relative timing of species interactions is shifting. The match-mismatch hypothesis (Cushing 1969) predicts that these shifts will lead to fitness consequences because there is selection for consumers and </a:t>
+            </a:r>
+            <a:r>
+              <a:rPr lang="en-CA" sz="1200" kern="1200" dirty="0" err="1" smtClean="0">
+                <a:solidFill>
+                  <a:schemeClr val="tx1"/>
+                </a:solidFill>
+                <a:effectLst/>
+                <a:latin typeface="+mn-lt"/>
+                <a:ea typeface="+mn-ea"/>
+                <a:cs typeface="+mn-cs"/>
+              </a:rPr>
+              <a:t>mutualists</a:t>
+            </a:r>
+            <a:r>
+              <a:rPr lang="en-CA" sz="1200" kern="1200" dirty="0" smtClean="0">
+                <a:solidFill>
+                  <a:schemeClr val="tx1"/>
+                </a:solidFill>
+                <a:effectLst/>
+                <a:latin typeface="+mn-lt"/>
+                <a:ea typeface="+mn-ea"/>
+                <a:cs typeface="+mn-cs"/>
+              </a:rPr>
+              <a:t> to synchronize their phenology to that of their resources to maximize their fitness (‘match’). Therefore, for those species in these roles, we would predict any shift in synchrony to lead to negative fitness consequences (‘mismatch’).</a:t>
+            </a:r>
+            <a:r>
+              <a:rPr lang="en-CA" dirty="0" smtClean="0">
+                <a:effectLst/>
+              </a:rPr>
+              <a:t> </a:t>
+            </a:r>
+          </a:p>
+          <a:p>
+            <a:pPr marL="0" marR="0" indent="0" algn="l" defTabSz="457200" rtl="0" eaLnBrk="1" fontAlgn="auto" latinLnBrk="0" hangingPunct="1">
+              <a:lnSpc>
+                <a:spcPct val="100000"/>
+              </a:lnSpc>
+              <a:spcBef>
+                <a:spcPts val="0"/>
+              </a:spcBef>
+              <a:spcAft>
+                <a:spcPts val="0"/>
+              </a:spcAft>
+              <a:buClrTx/>
+              <a:buSzTx/>
+              <a:buFontTx/>
+              <a:buNone/>
+              <a:tabLst/>
+              <a:defRPr/>
+            </a:pPr>
+            <a:endParaRPr lang="en-CA" dirty="0" smtClean="0">
+              <a:effectLst/>
+            </a:endParaRPr>
+          </a:p>
+          <a:p>
+            <a:pPr marL="0" marR="0" indent="0" algn="l" defTabSz="457200" rtl="0" eaLnBrk="1" fontAlgn="auto" latinLnBrk="0" hangingPunct="1">
+              <a:lnSpc>
+                <a:spcPct val="100000"/>
+              </a:lnSpc>
+              <a:spcBef>
+                <a:spcPts val="0"/>
+              </a:spcBef>
+              <a:spcAft>
+                <a:spcPts val="0"/>
+              </a:spcAft>
+              <a:buClrTx/>
+              <a:buSzTx/>
+              <a:buFontTx/>
+              <a:buNone/>
+              <a:tabLst/>
+              <a:defRPr/>
+            </a:pPr>
+            <a:endParaRPr lang="en-CA" dirty="0" smtClean="0">
+              <a:effectLst/>
+            </a:endParaRPr>
+          </a:p>
+          <a:p>
+            <a:pPr marL="0" marR="0" indent="0" algn="l" defTabSz="457200" rtl="0" eaLnBrk="1" fontAlgn="auto" latinLnBrk="0" hangingPunct="1">
+              <a:lnSpc>
+                <a:spcPct val="100000"/>
+              </a:lnSpc>
+              <a:spcBef>
+                <a:spcPts val="0"/>
+              </a:spcBef>
+              <a:spcAft>
+                <a:spcPts val="0"/>
+              </a:spcAft>
+              <a:buClrTx/>
+              <a:buSzTx/>
+              <a:buFontTx/>
+              <a:buNone/>
+              <a:tabLst/>
+              <a:defRPr/>
+            </a:pPr>
+            <a:r>
+              <a:rPr lang="en-US" sz="1200" kern="1200" dirty="0" smtClean="0">
+                <a:solidFill>
+                  <a:schemeClr val="tx1"/>
+                </a:solidFill>
+                <a:latin typeface="+mn-lt"/>
+                <a:ea typeface="+mn-ea"/>
+                <a:cs typeface="+mn-cs"/>
+              </a:rPr>
+              <a:t>Shifts in synchrony could lead to temporal changes in species’ performance  if a species’ performance is related to the relative timing of the interaction and there has been a directional change in synchrony over time.  Of course there are many reasons why we wouldn’t expect a relationship- discussion</a:t>
+            </a:r>
+          </a:p>
+          <a:p>
+            <a:pPr marL="0" marR="0" indent="0" algn="l" defTabSz="457200" rtl="0" eaLnBrk="1" fontAlgn="auto" latinLnBrk="0" hangingPunct="1">
+              <a:lnSpc>
+                <a:spcPct val="100000"/>
+              </a:lnSpc>
+              <a:spcBef>
+                <a:spcPts val="0"/>
+              </a:spcBef>
+              <a:spcAft>
+                <a:spcPts val="0"/>
+              </a:spcAft>
+              <a:buClrTx/>
+              <a:buSzTx/>
+              <a:buFontTx/>
+              <a:buNone/>
+              <a:tabLst/>
+              <a:defRPr/>
+            </a:pPr>
+            <a:endParaRPr lang="en-US" dirty="0" smtClean="0"/>
+          </a:p>
+          <a:p>
+            <a:endParaRPr lang="en-US" sz="1200" kern="1200" dirty="0">
+              <a:solidFill>
+                <a:schemeClr val="tx1"/>
+              </a:solidFill>
+              <a:latin typeface="+mn-lt"/>
+              <a:ea typeface="+mn-ea"/>
+              <a:cs typeface="+mn-cs"/>
+            </a:endParaRPr>
+          </a:p>
+        </p:txBody>
+      </p:sp>
+      <p:sp>
+        <p:nvSpPr>
+          <p:cNvPr id="4" name="Slide Number Placeholder 3"/>
+          <p:cNvSpPr>
+            <a:spLocks noGrp="1"/>
+          </p:cNvSpPr>
+          <p:nvPr>
+            <p:ph type="sldNum" sz="quarter" idx="10"/>
+          </p:nvPr>
+        </p:nvSpPr>
+        <p:spPr/>
+        <p:txBody>
           <a:bodyPr/>
           <a:lstStyle/>
           <a:p>
-            <a:r>
-              <a:rPr lang="en-US" baseline="0" dirty="0" smtClean="0"/>
-              <a:t>We know that species have been responding to climate change. We see changes at the individual and population level- as shown here. It’s less clear whether those changes can be linked to changes in </a:t>
-            </a:r>
-            <a:r>
-              <a:rPr lang="en-US" baseline="0" dirty="0" err="1" smtClean="0"/>
-              <a:t>phenological</a:t>
-            </a:r>
-            <a:r>
-              <a:rPr lang="en-US" baseline="0" dirty="0" smtClean="0"/>
-              <a:t> timing.</a:t>
-            </a:r>
-            <a:endParaRPr lang="en-US" dirty="0"/>
-          </a:p>
-        </p:txBody>
-      </p:sp>
-      <p:sp>
-        <p:nvSpPr>
-          <p:cNvPr id="4" name="Slide Number Placeholder 3"/>
-          <p:cNvSpPr>
-            <a:spLocks noGrp="1"/>
-          </p:cNvSpPr>
-          <p:nvPr>
-            <p:ph type="sldNum" sz="quarter" idx="10"/>
-          </p:nvPr>
-        </p:nvSpPr>
-        <p:spPr/>
-        <p:txBody>
-          <a:bodyPr/>
-          <a:lstStyle/>
-          <a:p>
-            <a:fld id="{EE767C92-0ACB-CC40-88B6-2B4628F13609}" type="slidenum">
+            <a:fld id="{0FA3A654-AFD7-7F49-B777-9BAB2BDE37CD}" type="slidenum">
               <a:rPr lang="en-US" smtClean="0"/>
-              <a:t>14</a:t>
+              <a:pPr/>
+              <a:t>9</a:t>
             </a:fld>
             <a:endParaRPr lang="en-US"/>
           </a:p>
         </p:txBody>
       </p:sp>
     </p:spTree>
-    <p:extLst>
-      <p:ext uri="{BB962C8B-B14F-4D97-AF65-F5344CB8AC3E}">
-        <p14:creationId xmlns:p14="http://schemas.microsoft.com/office/powerpoint/2010/main" val="3066085575"/>
-      </p:ext>
-    </p:extLst>
   </p:cSld>
   <p:clrMapOvr>
     <a:masterClrMapping/>
@@ -1101,6 +1191,210 @@
           <a:lstStyle/>
           <a:p>
             <a:r>
+              <a:rPr lang="en-US" sz="1200" b="0" i="0" u="none" strike="noStrike" kern="1200" baseline="0" dirty="0" smtClean="0">
+                <a:solidFill>
+                  <a:schemeClr val="tx1"/>
+                </a:solidFill>
+                <a:latin typeface="+mn-lt"/>
+                <a:ea typeface="+mn-ea"/>
+                <a:cs typeface="+mn-cs"/>
+              </a:rPr>
+              <a:t>One potential major impact of climate change is the modification of synchronization</a:t>
+            </a:r>
+          </a:p>
+          <a:p>
+            <a:r>
+              <a:rPr lang="en-US" sz="1200" b="0" i="0" u="none" strike="noStrike" kern="1200" baseline="0" dirty="0" smtClean="0">
+                <a:solidFill>
+                  <a:schemeClr val="tx1"/>
+                </a:solidFill>
+                <a:latin typeface="+mn-lt"/>
+                <a:ea typeface="+mn-ea"/>
+                <a:cs typeface="+mn-cs"/>
+              </a:rPr>
+              <a:t>between the phenology of different trophic levels</a:t>
+            </a:r>
+            <a:endParaRPr lang="en-US" dirty="0"/>
+          </a:p>
+        </p:txBody>
+      </p:sp>
+      <p:sp>
+        <p:nvSpPr>
+          <p:cNvPr id="4" name="Slide Number Placeholder 3"/>
+          <p:cNvSpPr>
+            <a:spLocks noGrp="1"/>
+          </p:cNvSpPr>
+          <p:nvPr>
+            <p:ph type="sldNum" sz="quarter" idx="10"/>
+          </p:nvPr>
+        </p:nvSpPr>
+        <p:spPr/>
+        <p:txBody>
+          <a:bodyPr/>
+          <a:lstStyle/>
+          <a:p>
+            <a:fld id="{EE767C92-0ACB-CC40-88B6-2B4628F13609}" type="slidenum">
+              <a:rPr lang="en-US" smtClean="0"/>
+              <a:t>15</a:t>
+            </a:fld>
+            <a:endParaRPr lang="en-US"/>
+          </a:p>
+        </p:txBody>
+      </p:sp>
+    </p:spTree>
+    <p:extLst>
+      <p:ext uri="{BB962C8B-B14F-4D97-AF65-F5344CB8AC3E}">
+        <p14:creationId xmlns:p14="http://schemas.microsoft.com/office/powerpoint/2010/main" val="3144514670"/>
+      </p:ext>
+    </p:extLst>
+  </p:cSld>
+  <p:clrMapOvr>
+    <a:masterClrMapping/>
+  </p:clrMapOvr>
+</p:notes>
+</file>
+
+<file path=ppt/notesSlides/notesSlide6.xml><?xml version="1.0" encoding="utf-8"?>
+<p:notes xmlns:a="http://schemas.openxmlformats.org/drawingml/2006/main" xmlns:r="http://schemas.openxmlformats.org/officeDocument/2006/relationships" xmlns:p="http://schemas.openxmlformats.org/presentationml/2006/main">
+  <p:cSld>
+    <p:spTree>
+      <p:nvGrpSpPr>
+        <p:cNvPr id="1" name=""/>
+        <p:cNvGrpSpPr/>
+        <p:nvPr/>
+      </p:nvGrpSpPr>
+      <p:grpSpPr>
+        <a:xfrm>
+          <a:off x="0" y="0"/>
+          <a:ext cx="0" cy="0"/>
+          <a:chOff x="0" y="0"/>
+          <a:chExt cx="0" cy="0"/>
+        </a:xfrm>
+      </p:grpSpPr>
+      <p:sp>
+        <p:nvSpPr>
+          <p:cNvPr id="2" name="Slide Image Placeholder 1"/>
+          <p:cNvSpPr>
+            <a:spLocks noGrp="1" noRot="1" noChangeAspect="1"/>
+          </p:cNvSpPr>
+          <p:nvPr>
+            <p:ph type="sldImg"/>
+          </p:nvPr>
+        </p:nvSpPr>
+        <p:spPr/>
+      </p:sp>
+      <p:sp>
+        <p:nvSpPr>
+          <p:cNvPr id="3" name="Notes Placeholder 2"/>
+          <p:cNvSpPr>
+            <a:spLocks noGrp="1"/>
+          </p:cNvSpPr>
+          <p:nvPr>
+            <p:ph type="body" idx="1"/>
+          </p:nvPr>
+        </p:nvSpPr>
+        <p:spPr/>
+        <p:txBody>
+          <a:bodyPr/>
+          <a:lstStyle/>
+          <a:p>
+            <a:r>
+              <a:rPr lang="en-US" baseline="0" dirty="0" smtClean="0"/>
+              <a:t>We know that species have been responding to climate change. We see changes at the individual and population level- as shown here. It’s less clear whether those changes can be linked to changes in </a:t>
+            </a:r>
+            <a:r>
+              <a:rPr lang="en-US" baseline="0" dirty="0" err="1" smtClean="0"/>
+              <a:t>phenological</a:t>
+            </a:r>
+            <a:r>
+              <a:rPr lang="en-US" baseline="0" dirty="0" smtClean="0"/>
+              <a:t> timing.</a:t>
+            </a:r>
+            <a:endParaRPr lang="en-US" dirty="0"/>
+          </a:p>
+        </p:txBody>
+      </p:sp>
+      <p:sp>
+        <p:nvSpPr>
+          <p:cNvPr id="4" name="Slide Number Placeholder 3"/>
+          <p:cNvSpPr>
+            <a:spLocks noGrp="1"/>
+          </p:cNvSpPr>
+          <p:nvPr>
+            <p:ph type="sldNum" sz="quarter" idx="10"/>
+          </p:nvPr>
+        </p:nvSpPr>
+        <p:spPr/>
+        <p:txBody>
+          <a:bodyPr/>
+          <a:lstStyle/>
+          <a:p>
+            <a:fld id="{EE767C92-0ACB-CC40-88B6-2B4628F13609}" type="slidenum">
+              <a:rPr lang="en-US" smtClean="0"/>
+              <a:t>16</a:t>
+            </a:fld>
+            <a:endParaRPr lang="en-US"/>
+          </a:p>
+        </p:txBody>
+      </p:sp>
+    </p:spTree>
+    <p:extLst>
+      <p:ext uri="{BB962C8B-B14F-4D97-AF65-F5344CB8AC3E}">
+        <p14:creationId xmlns:p14="http://schemas.microsoft.com/office/powerpoint/2010/main" val="3066085575"/>
+      </p:ext>
+    </p:extLst>
+  </p:cSld>
+  <p:clrMapOvr>
+    <a:masterClrMapping/>
+  </p:clrMapOvr>
+</p:notes>
+</file>
+
+<file path=ppt/notesSlides/notesSlide7.xml><?xml version="1.0" encoding="utf-8"?>
+<p:notes xmlns:a="http://schemas.openxmlformats.org/drawingml/2006/main" xmlns:r="http://schemas.openxmlformats.org/officeDocument/2006/relationships" xmlns:p="http://schemas.openxmlformats.org/presentationml/2006/main">
+  <p:cSld>
+    <p:spTree>
+      <p:nvGrpSpPr>
+        <p:cNvPr id="1" name=""/>
+        <p:cNvGrpSpPr/>
+        <p:nvPr/>
+      </p:nvGrpSpPr>
+      <p:grpSpPr>
+        <a:xfrm>
+          <a:off x="0" y="0"/>
+          <a:ext cx="0" cy="0"/>
+          <a:chOff x="0" y="0"/>
+          <a:chExt cx="0" cy="0"/>
+        </a:xfrm>
+      </p:grpSpPr>
+      <p:sp>
+        <p:nvSpPr>
+          <p:cNvPr id="2" name="Slide Image Placeholder 1"/>
+          <p:cNvSpPr>
+            <a:spLocks noGrp="1" noRot="1" noChangeAspect="1"/>
+          </p:cNvSpPr>
+          <p:nvPr>
+            <p:ph type="sldImg"/>
+          </p:nvPr>
+        </p:nvSpPr>
+        <p:spPr/>
+      </p:sp>
+      <p:sp>
+        <p:nvSpPr>
+          <p:cNvPr id="3" name="Notes Placeholder 2"/>
+          <p:cNvSpPr>
+            <a:spLocks noGrp="1"/>
+          </p:cNvSpPr>
+          <p:nvPr>
+            <p:ph type="body" idx="1"/>
+          </p:nvPr>
+        </p:nvSpPr>
+        <p:spPr/>
+        <p:txBody>
+          <a:bodyPr/>
+          <a:lstStyle/>
+          <a:p>
+            <a:r>
               <a:rPr lang="en-US" i="0" dirty="0" smtClean="0"/>
               <a:t>Model: </a:t>
             </a:r>
@@ -1163,7 +1457,7 @@
           <a:p>
             <a:fld id="{EE767C92-0ACB-CC40-88B6-2B4628F13609}" type="slidenum">
               <a:rPr lang="en-US" smtClean="0"/>
-              <a:t>18</a:t>
+              <a:t>20</a:t>
             </a:fld>
             <a:endParaRPr lang="en-US"/>
           </a:p>
@@ -1363,7 +1657,7 @@
           <a:p>
             <a:fld id="{0F4CA180-DC5E-F245-A9C0-91BC5D745733}" type="datetimeFigureOut">
               <a:rPr lang="en-US" smtClean="0"/>
-              <a:t>17-08-09</a:t>
+              <a:t>17-08-10</a:t>
             </a:fld>
             <a:endParaRPr lang="en-US"/>
           </a:p>
@@ -1533,7 +1827,7 @@
           <a:p>
             <a:fld id="{0F4CA180-DC5E-F245-A9C0-91BC5D745733}" type="datetimeFigureOut">
               <a:rPr lang="en-US" smtClean="0"/>
-              <a:t>17-08-09</a:t>
+              <a:t>17-08-10</a:t>
             </a:fld>
             <a:endParaRPr lang="en-US"/>
           </a:p>
@@ -1713,7 +2007,7 @@
           <a:p>
             <a:fld id="{0F4CA180-DC5E-F245-A9C0-91BC5D745733}" type="datetimeFigureOut">
               <a:rPr lang="en-US" smtClean="0"/>
-              <a:t>17-08-09</a:t>
+              <a:t>17-08-10</a:t>
             </a:fld>
             <a:endParaRPr lang="en-US"/>
           </a:p>
@@ -1883,7 +2177,7 @@
           <a:p>
             <a:fld id="{0F4CA180-DC5E-F245-A9C0-91BC5D745733}" type="datetimeFigureOut">
               <a:rPr lang="en-US" smtClean="0"/>
-              <a:t>17-08-09</a:t>
+              <a:t>17-08-10</a:t>
             </a:fld>
             <a:endParaRPr lang="en-US"/>
           </a:p>
@@ -2129,7 +2423,7 @@
           <a:p>
             <a:fld id="{0F4CA180-DC5E-F245-A9C0-91BC5D745733}" type="datetimeFigureOut">
               <a:rPr lang="en-US" smtClean="0"/>
-              <a:t>17-08-09</a:t>
+              <a:t>17-08-10</a:t>
             </a:fld>
             <a:endParaRPr lang="en-US"/>
           </a:p>
@@ -2417,7 +2711,7 @@
           <a:p>
             <a:fld id="{0F4CA180-DC5E-F245-A9C0-91BC5D745733}" type="datetimeFigureOut">
               <a:rPr lang="en-US" smtClean="0"/>
-              <a:t>17-08-09</a:t>
+              <a:t>17-08-10</a:t>
             </a:fld>
             <a:endParaRPr lang="en-US"/>
           </a:p>
@@ -2839,7 +3133,7 @@
           <a:p>
             <a:fld id="{0F4CA180-DC5E-F245-A9C0-91BC5D745733}" type="datetimeFigureOut">
               <a:rPr lang="en-US" smtClean="0"/>
-              <a:t>17-08-09</a:t>
+              <a:t>17-08-10</a:t>
             </a:fld>
             <a:endParaRPr lang="en-US"/>
           </a:p>
@@ -2957,7 +3251,7 @@
           <a:p>
             <a:fld id="{0F4CA180-DC5E-F245-A9C0-91BC5D745733}" type="datetimeFigureOut">
               <a:rPr lang="en-US" smtClean="0"/>
-              <a:t>17-08-09</a:t>
+              <a:t>17-08-10</a:t>
             </a:fld>
             <a:endParaRPr lang="en-US"/>
           </a:p>
@@ -3052,7 +3346,7 @@
           <a:p>
             <a:fld id="{0F4CA180-DC5E-F245-A9C0-91BC5D745733}" type="datetimeFigureOut">
               <a:rPr lang="en-US" smtClean="0"/>
-              <a:t>17-08-09</a:t>
+              <a:t>17-08-10</a:t>
             </a:fld>
             <a:endParaRPr lang="en-US"/>
           </a:p>
@@ -3329,7 +3623,7 @@
           <a:p>
             <a:fld id="{0F4CA180-DC5E-F245-A9C0-91BC5D745733}" type="datetimeFigureOut">
               <a:rPr lang="en-US" smtClean="0"/>
-              <a:t>17-08-09</a:t>
+              <a:t>17-08-10</a:t>
             </a:fld>
             <a:endParaRPr lang="en-US"/>
           </a:p>
@@ -3582,7 +3876,7 @@
           <a:p>
             <a:fld id="{0F4CA180-DC5E-F245-A9C0-91BC5D745733}" type="datetimeFigureOut">
               <a:rPr lang="en-US" smtClean="0"/>
-              <a:t>17-08-09</a:t>
+              <a:t>17-08-10</a:t>
             </a:fld>
             <a:endParaRPr lang="en-US"/>
           </a:p>
@@ -3795,7 +4089,7 @@
           <a:p>
             <a:fld id="{0F4CA180-DC5E-F245-A9C0-91BC5D745733}" type="datetimeFigureOut">
               <a:rPr lang="en-US" smtClean="0"/>
-              <a:t>17-08-09</a:t>
+              <a:t>17-08-10</a:t>
             </a:fld>
             <a:endParaRPr lang="en-US"/>
           </a:p>
@@ -4240,6 +4534,430 @@
       </p:grpSpPr>
       <p:sp>
         <p:nvSpPr>
+          <p:cNvPr id="3" name="Content Placeholder 2"/>
+          <p:cNvSpPr>
+            <a:spLocks noGrp="1"/>
+          </p:cNvSpPr>
+          <p:nvPr>
+            <p:ph idx="1"/>
+          </p:nvPr>
+        </p:nvSpPr>
+        <p:spPr>
+          <a:xfrm>
+            <a:off x="656113" y="2470934"/>
+            <a:ext cx="8229600" cy="4525963"/>
+          </a:xfrm>
+        </p:spPr>
+        <p:txBody>
+          <a:bodyPr>
+            <a:normAutofit/>
+          </a:bodyPr>
+          <a:lstStyle/>
+          <a:p>
+            <a:r>
+              <a:rPr lang="en-US" sz="2800" dirty="0"/>
+              <a:t>T</a:t>
+            </a:r>
+            <a:r>
+              <a:rPr lang="en-US" sz="2800" dirty="0" smtClean="0"/>
+              <a:t>ime-based (i.e. operational, not based on fitness)</a:t>
+            </a:r>
+          </a:p>
+          <a:p>
+            <a:r>
+              <a:rPr lang="en-US" sz="2800" dirty="0" smtClean="0"/>
+              <a:t>Units had to be days</a:t>
+            </a:r>
+          </a:p>
+          <a:p>
+            <a:r>
+              <a:rPr lang="en-US" sz="2800" dirty="0" smtClean="0"/>
+              <a:t>Used </a:t>
+            </a:r>
+            <a:r>
+              <a:rPr lang="en-US" sz="2800" dirty="0" err="1" smtClean="0"/>
+              <a:t>phenological</a:t>
+            </a:r>
+            <a:r>
+              <a:rPr lang="en-US" sz="2800" dirty="0" smtClean="0"/>
+              <a:t> phases used by authors</a:t>
+            </a:r>
+          </a:p>
+          <a:p>
+            <a:r>
+              <a:rPr lang="en-US" sz="2800" dirty="0" smtClean="0"/>
+              <a:t>To standardize mismatch: </a:t>
+            </a:r>
+          </a:p>
+          <a:p>
+            <a:pPr lvl="1"/>
+            <a:r>
+              <a:rPr lang="en-US" dirty="0" smtClean="0"/>
+              <a:t>larger values= events occur further apart</a:t>
+            </a:r>
+          </a:p>
+          <a:p>
+            <a:pPr lvl="1"/>
+            <a:r>
+              <a:rPr lang="en-US" dirty="0" smtClean="0"/>
+              <a:t>1</a:t>
+            </a:r>
+            <a:r>
+              <a:rPr lang="en-US" baseline="30000" dirty="0" smtClean="0"/>
+              <a:t>st</a:t>
+            </a:r>
+            <a:r>
+              <a:rPr lang="en-US" dirty="0" smtClean="0"/>
+              <a:t> approach: Isolated time period to when food was available- consumer emerged after resource</a:t>
+            </a:r>
+          </a:p>
+          <a:p>
+            <a:pPr lvl="1"/>
+            <a:r>
+              <a:rPr lang="en-US" dirty="0" smtClean="0"/>
+              <a:t>2</a:t>
+            </a:r>
+            <a:r>
+              <a:rPr lang="en-US" baseline="30000" dirty="0" smtClean="0"/>
+              <a:t>nd</a:t>
+            </a:r>
+            <a:r>
+              <a:rPr lang="en-US" dirty="0" smtClean="0"/>
+              <a:t> approach: true test- is there a perfect match?</a:t>
+            </a:r>
+          </a:p>
+          <a:p>
+            <a:endParaRPr lang="en-US" dirty="0" smtClean="0"/>
+          </a:p>
+        </p:txBody>
+      </p:sp>
+      <p:sp>
+        <p:nvSpPr>
+          <p:cNvPr id="4" name="TextBox 3"/>
+          <p:cNvSpPr txBox="1"/>
+          <p:nvPr/>
+        </p:nvSpPr>
+        <p:spPr>
+          <a:xfrm>
+            <a:off x="643986" y="381863"/>
+            <a:ext cx="5895364" cy="584776"/>
+          </a:xfrm>
+          <a:prstGeom prst="rect">
+            <a:avLst/>
+          </a:prstGeom>
+          <a:noFill/>
+        </p:spPr>
+        <p:txBody>
+          <a:bodyPr wrap="none" rtlCol="0">
+            <a:spAutoFit/>
+          </a:bodyPr>
+          <a:lstStyle/>
+          <a:p>
+            <a:r>
+              <a:rPr lang="en-US" sz="3200" dirty="0" smtClean="0"/>
+              <a:t>Defining mismatch: First approach </a:t>
+            </a:r>
+            <a:endParaRPr lang="en-US" sz="3200" dirty="0"/>
+          </a:p>
+        </p:txBody>
+      </p:sp>
+      <p:pic>
+        <p:nvPicPr>
+          <p:cNvPr id="8" name="Picture 7"/>
+          <p:cNvPicPr>
+            <a:picLocks noChangeAspect="1"/>
+          </p:cNvPicPr>
+          <p:nvPr/>
+        </p:nvPicPr>
+        <p:blipFill rotWithShape="1">
+          <a:blip r:embed="rId2"/>
+          <a:srcRect t="86532" r="-5336"/>
+          <a:stretch/>
+        </p:blipFill>
+        <p:spPr>
+          <a:xfrm>
+            <a:off x="878568" y="1328610"/>
+            <a:ext cx="7852681" cy="836387"/>
+          </a:xfrm>
+          <a:prstGeom prst="rect">
+            <a:avLst/>
+          </a:prstGeom>
+          <a:ln>
+            <a:solidFill>
+              <a:srgbClr val="000000"/>
+            </a:solidFill>
+          </a:ln>
+        </p:spPr>
+      </p:pic>
+      <p:sp>
+        <p:nvSpPr>
+          <p:cNvPr id="2" name="Rectangle 1"/>
+          <p:cNvSpPr/>
+          <p:nvPr/>
+        </p:nvSpPr>
+        <p:spPr>
+          <a:xfrm>
+            <a:off x="4889500" y="1328610"/>
+            <a:ext cx="3841749" cy="836387"/>
+          </a:xfrm>
+          <a:prstGeom prst="rect">
+            <a:avLst/>
+          </a:prstGeom>
+        </p:spPr>
+        <p:style>
+          <a:lnRef idx="1">
+            <a:schemeClr val="accent1"/>
+          </a:lnRef>
+          <a:fillRef idx="3">
+            <a:schemeClr val="accent1"/>
+          </a:fillRef>
+          <a:effectRef idx="2">
+            <a:schemeClr val="accent1"/>
+          </a:effectRef>
+          <a:fontRef idx="minor">
+            <a:schemeClr val="lt1"/>
+          </a:fontRef>
+        </p:style>
+        <p:txBody>
+          <a:bodyPr rtlCol="0" anchor="ctr"/>
+          <a:lstStyle/>
+          <a:p>
+            <a:pPr algn="ctr"/>
+            <a:endParaRPr lang="en-US"/>
+          </a:p>
+        </p:txBody>
+      </p:sp>
+    </p:spTree>
+    <p:extLst>
+      <p:ext uri="{BB962C8B-B14F-4D97-AF65-F5344CB8AC3E}">
+        <p14:creationId xmlns:p14="http://schemas.microsoft.com/office/powerpoint/2010/main" val="3333850739"/>
+      </p:ext>
+    </p:extLst>
+  </p:cSld>
+  <p:clrMapOvr>
+    <a:masterClrMapping/>
+  </p:clrMapOvr>
+</p:sld>
+</file>
+
+<file path=ppt/slides/slide11.xml><?xml version="1.0" encoding="utf-8"?>
+<p:sld xmlns:a="http://schemas.openxmlformats.org/drawingml/2006/main" xmlns:r="http://schemas.openxmlformats.org/officeDocument/2006/relationships" xmlns:p="http://schemas.openxmlformats.org/presentationml/2006/main">
+  <p:cSld>
+    <p:spTree>
+      <p:nvGrpSpPr>
+        <p:cNvPr id="1" name=""/>
+        <p:cNvGrpSpPr/>
+        <p:nvPr/>
+      </p:nvGrpSpPr>
+      <p:grpSpPr>
+        <a:xfrm>
+          <a:off x="0" y="0"/>
+          <a:ext cx="0" cy="0"/>
+          <a:chOff x="0" y="0"/>
+          <a:chExt cx="0" cy="0"/>
+        </a:xfrm>
+      </p:grpSpPr>
+      <p:sp>
+        <p:nvSpPr>
+          <p:cNvPr id="4" name="TextBox 3"/>
+          <p:cNvSpPr txBox="1"/>
+          <p:nvPr/>
+        </p:nvSpPr>
+        <p:spPr>
+          <a:xfrm>
+            <a:off x="127000" y="86647"/>
+            <a:ext cx="7338780" cy="369332"/>
+          </a:xfrm>
+          <a:prstGeom prst="rect">
+            <a:avLst/>
+          </a:prstGeom>
+          <a:noFill/>
+        </p:spPr>
+        <p:txBody>
+          <a:bodyPr wrap="none" rtlCol="0">
+            <a:spAutoFit/>
+          </a:bodyPr>
+          <a:lstStyle/>
+          <a:p>
+            <a:r>
+              <a:rPr lang="en-US" dirty="0" smtClean="0"/>
+              <a:t>Test of mismatch hypothesis: when food is available=&gt; terrestrial </a:t>
+            </a:r>
+            <a:r>
+              <a:rPr lang="en-US" dirty="0" err="1" smtClean="0"/>
+              <a:t>vs</a:t>
+            </a:r>
+            <a:r>
+              <a:rPr lang="en-US" dirty="0" smtClean="0"/>
+              <a:t> aquatic</a:t>
+            </a:r>
+            <a:endParaRPr lang="en-US" dirty="0"/>
+          </a:p>
+        </p:txBody>
+      </p:sp>
+      <p:sp>
+        <p:nvSpPr>
+          <p:cNvPr id="2" name="TextBox 1"/>
+          <p:cNvSpPr txBox="1"/>
+          <p:nvPr/>
+        </p:nvSpPr>
+        <p:spPr>
+          <a:xfrm>
+            <a:off x="5263931" y="709448"/>
+            <a:ext cx="2231726" cy="1200329"/>
+          </a:xfrm>
+          <a:prstGeom prst="rect">
+            <a:avLst/>
+          </a:prstGeom>
+          <a:noFill/>
+        </p:spPr>
+        <p:txBody>
+          <a:bodyPr wrap="none" rtlCol="0">
+            <a:spAutoFit/>
+          </a:bodyPr>
+          <a:lstStyle/>
+          <a:p>
+            <a:r>
+              <a:rPr lang="en-US" dirty="0" smtClean="0"/>
+              <a:t>Aquatic: n=17</a:t>
+            </a:r>
+          </a:p>
+          <a:p>
+            <a:r>
+              <a:rPr lang="en-US" dirty="0" smtClean="0"/>
+              <a:t>slope= </a:t>
+            </a:r>
+            <a:r>
+              <a:rPr lang="en-US" dirty="0"/>
+              <a:t>-0.02 (-0.04, 0</a:t>
+            </a:r>
+            <a:r>
+              <a:rPr lang="en-US" dirty="0" smtClean="0"/>
+              <a:t>)</a:t>
+            </a:r>
+          </a:p>
+          <a:p>
+            <a:endParaRPr lang="en-US" dirty="0"/>
+          </a:p>
+          <a:p>
+            <a:endParaRPr lang="en-US" dirty="0"/>
+          </a:p>
+        </p:txBody>
+      </p:sp>
+      <p:pic>
+        <p:nvPicPr>
+          <p:cNvPr id="5" name="Picture 4"/>
+          <p:cNvPicPr>
+            <a:picLocks noChangeAspect="1"/>
+          </p:cNvPicPr>
+          <p:nvPr/>
+        </p:nvPicPr>
+        <p:blipFill>
+          <a:blip r:embed="rId2"/>
+          <a:stretch>
+            <a:fillRect/>
+          </a:stretch>
+        </p:blipFill>
+        <p:spPr>
+          <a:xfrm>
+            <a:off x="0" y="1738149"/>
+            <a:ext cx="4775200" cy="4800600"/>
+          </a:xfrm>
+          <a:prstGeom prst="rect">
+            <a:avLst/>
+          </a:prstGeom>
+        </p:spPr>
+      </p:pic>
+      <p:sp>
+        <p:nvSpPr>
+          <p:cNvPr id="7" name="Rectangle 6"/>
+          <p:cNvSpPr/>
+          <p:nvPr/>
+        </p:nvSpPr>
+        <p:spPr>
+          <a:xfrm>
+            <a:off x="621862" y="1097101"/>
+            <a:ext cx="4572000" cy="646331"/>
+          </a:xfrm>
+          <a:prstGeom prst="rect">
+            <a:avLst/>
+          </a:prstGeom>
+        </p:spPr>
+        <p:txBody>
+          <a:bodyPr>
+            <a:spAutoFit/>
+          </a:bodyPr>
+          <a:lstStyle/>
+          <a:p>
+            <a:r>
+              <a:rPr lang="en-US" dirty="0"/>
+              <a:t>Terrestrial: n=7</a:t>
+            </a:r>
+          </a:p>
+          <a:p>
+            <a:r>
+              <a:rPr lang="en-US" dirty="0"/>
+              <a:t>Slope=-0.04 (-0.10 to 0.03)</a:t>
+            </a:r>
+          </a:p>
+        </p:txBody>
+      </p:sp>
+      <p:pic>
+        <p:nvPicPr>
+          <p:cNvPr id="9" name="Picture 8"/>
+          <p:cNvPicPr>
+            <a:picLocks noChangeAspect="1"/>
+          </p:cNvPicPr>
+          <p:nvPr/>
+        </p:nvPicPr>
+        <p:blipFill>
+          <a:blip r:embed="rId3"/>
+          <a:stretch>
+            <a:fillRect/>
+          </a:stretch>
+        </p:blipFill>
+        <p:spPr>
+          <a:xfrm>
+            <a:off x="4741929" y="1738149"/>
+            <a:ext cx="4775200" cy="4800600"/>
+          </a:xfrm>
+          <a:prstGeom prst="rect">
+            <a:avLst/>
+          </a:prstGeom>
+        </p:spPr>
+      </p:pic>
+    </p:spTree>
+    <p:extLst>
+      <p:ext uri="{BB962C8B-B14F-4D97-AF65-F5344CB8AC3E}">
+        <p14:creationId xmlns:p14="http://schemas.microsoft.com/office/powerpoint/2010/main" val="1586308401"/>
+      </p:ext>
+    </p:extLst>
+  </p:cSld>
+  <p:clrMapOvr>
+    <a:masterClrMapping/>
+  </p:clrMapOvr>
+</p:sld>
+</file>
+
+<file path=ppt/slides/slide12.xml><?xml version="1.0" encoding="utf-8"?>
+<p:sld xmlns:a="http://schemas.openxmlformats.org/drawingml/2006/main" xmlns:r="http://schemas.openxmlformats.org/officeDocument/2006/relationships" xmlns:p="http://schemas.openxmlformats.org/presentationml/2006/main">
+  <p:cSld>
+    <p:spTree>
+      <p:nvGrpSpPr>
+        <p:cNvPr id="1" name=""/>
+        <p:cNvGrpSpPr/>
+        <p:nvPr/>
+      </p:nvGrpSpPr>
+      <p:grpSpPr>
+        <a:xfrm>
+          <a:off x="0" y="0"/>
+          <a:ext cx="0" cy="0"/>
+          <a:chOff x="0" y="0"/>
+          <a:chExt cx="0" cy="0"/>
+        </a:xfrm>
+      </p:grpSpPr>
+      <p:sp>
+        <p:nvSpPr>
           <p:cNvPr id="2" name="Title 1"/>
           <p:cNvSpPr>
             <a:spLocks noGrp="1"/>
@@ -4345,7 +5063,7 @@
 </p:sld>
 </file>
 
-<file path=ppt/slides/slide11.xml><?xml version="1.0" encoding="utf-8"?>
+<file path=ppt/slides/slide13.xml><?xml version="1.0" encoding="utf-8"?>
 <p:sld xmlns:a="http://schemas.openxmlformats.org/drawingml/2006/main" xmlns:r="http://schemas.openxmlformats.org/officeDocument/2006/relationships" xmlns:p="http://schemas.openxmlformats.org/presentationml/2006/main">
   <p:cSld>
     <p:spTree>
@@ -4410,11 +5128,7 @@
           <a:p>
             <a:r>
               <a:rPr lang="en-US" dirty="0" smtClean="0"/>
-              <a:t>Test of mismatch hypothesis: </a:t>
-            </a:r>
-            <a:r>
-              <a:rPr lang="en-US" dirty="0" smtClean="0"/>
-              <a:t>is there a match?</a:t>
+              <a:t>Test of mismatch hypothesis: is there a match?</a:t>
             </a:r>
             <a:endParaRPr lang="en-US" dirty="0"/>
           </a:p>
@@ -4474,7 +5188,7 @@
 </p:sld>
 </file>
 
-<file path=ppt/slides/slide12.xml><?xml version="1.0" encoding="utf-8"?>
+<file path=ppt/slides/slide14.xml><?xml version="1.0" encoding="utf-8"?>
 <p:sld xmlns:a="http://schemas.openxmlformats.org/drawingml/2006/main" xmlns:r="http://schemas.openxmlformats.org/officeDocument/2006/relationships" xmlns:p="http://schemas.openxmlformats.org/presentationml/2006/main">
   <p:cSld>
     <p:spTree>
@@ -4577,7 +5291,7 @@
 </p:sld>
 </file>
 
-<file path=ppt/slides/slide13.xml><?xml version="1.0" encoding="utf-8"?>
+<file path=ppt/slides/slide15.xml><?xml version="1.0" encoding="utf-8"?>
 <p:sld xmlns:a="http://schemas.openxmlformats.org/drawingml/2006/main" xmlns:r="http://schemas.openxmlformats.org/officeDocument/2006/relationships" xmlns:p="http://schemas.openxmlformats.org/presentationml/2006/main">
   <p:cSld>
     <p:spTree>
@@ -4648,11 +5362,7 @@
             <a:pPr algn="l"/>
             <a:r>
               <a:rPr lang="en-US" sz="2800" dirty="0" smtClean="0"/>
-              <a:t>Context: </a:t>
-            </a:r>
-            <a:r>
-              <a:rPr lang="en-US" sz="2800" dirty="0" smtClean="0"/>
-              <a:t>Consistent with climate change, </a:t>
+              <a:t>Context: Consistent with climate change, </a:t>
             </a:r>
             <a:r>
               <a:rPr lang="en-US" sz="2800" dirty="0" err="1" smtClean="0"/>
@@ -4660,11 +5370,7 @@
             </a:r>
             <a:r>
               <a:rPr lang="en-US" sz="2800" dirty="0" smtClean="0"/>
-              <a:t> </a:t>
-            </a:r>
-            <a:r>
-              <a:rPr lang="en-US" sz="2800" dirty="0" smtClean="0"/>
-              <a:t>synchrony is changing</a:t>
+              <a:t> synchrony is changing</a:t>
             </a:r>
             <a:endParaRPr lang="en-US" sz="2800" dirty="0"/>
           </a:p>
@@ -4683,7 +5389,7 @@
 </p:sld>
 </file>
 
-<file path=ppt/slides/slide14.xml><?xml version="1.0" encoding="utf-8"?>
+<file path=ppt/slides/slide16.xml><?xml version="1.0" encoding="utf-8"?>
 <p:sld xmlns:a="http://schemas.openxmlformats.org/drawingml/2006/main" xmlns:r="http://schemas.openxmlformats.org/officeDocument/2006/relationships" xmlns:p="http://schemas.openxmlformats.org/presentationml/2006/main">
   <p:cSld>
     <p:spTree>
@@ -4719,11 +5425,7 @@
           <a:p>
             <a:r>
               <a:rPr lang="en-US" dirty="0" smtClean="0"/>
-              <a:t>What </a:t>
-            </a:r>
-            <a:r>
-              <a:rPr lang="en-US" dirty="0" smtClean="0"/>
-              <a:t>are the consequences of these changes?</a:t>
+              <a:t>What are the consequences of these changes?</a:t>
             </a:r>
             <a:endParaRPr lang="en-US" dirty="0"/>
           </a:p>
@@ -4819,7 +5521,7 @@
 </p:sld>
 </file>
 
-<file path=ppt/slides/slide15.xml><?xml version="1.0" encoding="utf-8"?>
+<file path=ppt/slides/slide17.xml><?xml version="1.0" encoding="utf-8"?>
 <p:sld xmlns:a="http://schemas.openxmlformats.org/drawingml/2006/main" xmlns:r="http://schemas.openxmlformats.org/officeDocument/2006/relationships" xmlns:p="http://schemas.openxmlformats.org/presentationml/2006/main">
   <p:cSld>
     <p:spTree>
@@ -4868,7 +5570,6 @@
               <a:rPr lang="en-US" dirty="0" smtClean="0"/>
               <a:t>Only interactions with both types of mismatch included</a:t>
             </a:r>
-            <a:endParaRPr lang="en-US" dirty="0" smtClean="0"/>
           </a:p>
         </p:txBody>
       </p:sp>
@@ -5121,7 +5822,7 @@
 </p:sld>
 </file>
 
-<file path=ppt/slides/slide16.xml><?xml version="1.0" encoding="utf-8"?>
+<file path=ppt/slides/slide18.xml><?xml version="1.0" encoding="utf-8"?>
 <p:sld xmlns:a="http://schemas.openxmlformats.org/drawingml/2006/main" xmlns:r="http://schemas.openxmlformats.org/officeDocument/2006/relationships" xmlns:p="http://schemas.openxmlformats.org/presentationml/2006/main">
   <p:cSld>
     <p:spTree>
@@ -5189,7 +5890,7 @@
 </p:sld>
 </file>
 
-<file path=ppt/slides/slide17.xml><?xml version="1.0" encoding="utf-8"?>
+<file path=ppt/slides/slide19.xml><?xml version="1.0" encoding="utf-8"?>
 <p:sld xmlns:a="http://schemas.openxmlformats.org/drawingml/2006/main" xmlns:r="http://schemas.openxmlformats.org/officeDocument/2006/relationships" xmlns:p="http://schemas.openxmlformats.org/presentationml/2006/main">
   <p:cSld>
     <p:spTree>
@@ -5243,7 +5944,207 @@
 </p:sld>
 </file>
 
-<file path=ppt/slides/slide18.xml><?xml version="1.0" encoding="utf-8"?>
+<file path=ppt/slides/slide2.xml><?xml version="1.0" encoding="utf-8"?>
+<p:sld xmlns:a="http://schemas.openxmlformats.org/drawingml/2006/main" xmlns:r="http://schemas.openxmlformats.org/officeDocument/2006/relationships" xmlns:p="http://schemas.openxmlformats.org/presentationml/2006/main">
+  <p:cSld>
+    <p:spTree>
+      <p:nvGrpSpPr>
+        <p:cNvPr id="1" name=""/>
+        <p:cNvGrpSpPr/>
+        <p:nvPr/>
+      </p:nvGrpSpPr>
+      <p:grpSpPr>
+        <a:xfrm>
+          <a:off x="0" y="0"/>
+          <a:ext cx="0" cy="0"/>
+          <a:chOff x="0" y="0"/>
+          <a:chExt cx="0" cy="0"/>
+        </a:xfrm>
+      </p:grpSpPr>
+      <p:sp>
+        <p:nvSpPr>
+          <p:cNvPr id="6" name="TextBox 5"/>
+          <p:cNvSpPr txBox="1"/>
+          <p:nvPr/>
+        </p:nvSpPr>
+        <p:spPr>
+          <a:xfrm>
+            <a:off x="0" y="1142152"/>
+            <a:ext cx="5120963" cy="646331"/>
+          </a:xfrm>
+          <a:prstGeom prst="rect">
+            <a:avLst/>
+          </a:prstGeom>
+          <a:noFill/>
+        </p:spPr>
+        <p:txBody>
+          <a:bodyPr wrap="none" rtlCol="0">
+            <a:spAutoFit/>
+          </a:bodyPr>
+          <a:lstStyle/>
+          <a:p>
+            <a:r>
+              <a:rPr lang="en-US" dirty="0" smtClean="0"/>
+              <a:t>Linear term (mu_b1): -0.01 (-0.02, 0.002)</a:t>
+            </a:r>
+          </a:p>
+          <a:p>
+            <a:r>
+              <a:rPr lang="en-US" dirty="0" smtClean="0"/>
+              <a:t>Quadratic term (mu_b2)</a:t>
+            </a:r>
+            <a:r>
+              <a:rPr lang="en-US" dirty="0"/>
+              <a:t>: </a:t>
+            </a:r>
+            <a:r>
+              <a:rPr lang="en-US" dirty="0" smtClean="0"/>
+              <a:t>0.00006 (-0.0003, 0.00013)</a:t>
+            </a:r>
+          </a:p>
+        </p:txBody>
+      </p:sp>
+      <p:sp>
+        <p:nvSpPr>
+          <p:cNvPr id="7" name="TextBox 6"/>
+          <p:cNvSpPr txBox="1"/>
+          <p:nvPr/>
+        </p:nvSpPr>
+        <p:spPr>
+          <a:xfrm>
+            <a:off x="127000" y="86647"/>
+            <a:ext cx="7051730" cy="1077218"/>
+          </a:xfrm>
+          <a:prstGeom prst="rect">
+            <a:avLst/>
+          </a:prstGeom>
+          <a:noFill/>
+        </p:spPr>
+        <p:txBody>
+          <a:bodyPr wrap="none" rtlCol="0">
+            <a:spAutoFit/>
+          </a:bodyPr>
+          <a:lstStyle/>
+          <a:p>
+            <a:r>
+              <a:rPr lang="en-US" sz="3200" dirty="0" smtClean="0"/>
+              <a:t>Test of mismatch hypothesis: full picture</a:t>
+            </a:r>
+          </a:p>
+          <a:p>
+            <a:r>
+              <a:rPr lang="en-US" sz="3200" dirty="0" smtClean="0"/>
+              <a:t>**** NOT SURE HOW TO SHOW RESULTS</a:t>
+            </a:r>
+            <a:endParaRPr lang="en-US" sz="3200" dirty="0"/>
+          </a:p>
+        </p:txBody>
+      </p:sp>
+      <p:sp>
+        <p:nvSpPr>
+          <p:cNvPr id="10" name="TextBox 9"/>
+          <p:cNvSpPr txBox="1"/>
+          <p:nvPr/>
+        </p:nvSpPr>
+        <p:spPr>
+          <a:xfrm>
+            <a:off x="7292211" y="6469538"/>
+            <a:ext cx="1851789" cy="369332"/>
+          </a:xfrm>
+          <a:prstGeom prst="rect">
+            <a:avLst/>
+          </a:prstGeom>
+          <a:noFill/>
+        </p:spPr>
+        <p:txBody>
+          <a:bodyPr wrap="none" rtlCol="0">
+            <a:spAutoFit/>
+          </a:bodyPr>
+          <a:lstStyle/>
+          <a:p>
+            <a:r>
+              <a:rPr lang="en-US" dirty="0" smtClean="0"/>
+              <a:t>N=21 interactions</a:t>
+            </a:r>
+            <a:endParaRPr lang="en-US" dirty="0"/>
+          </a:p>
+        </p:txBody>
+      </p:sp>
+      <p:pic>
+        <p:nvPicPr>
+          <p:cNvPr id="13" name="Picture 12"/>
+          <p:cNvPicPr>
+            <a:picLocks noChangeAspect="1"/>
+          </p:cNvPicPr>
+          <p:nvPr/>
+        </p:nvPicPr>
+        <p:blipFill>
+          <a:blip r:embed="rId3"/>
+          <a:stretch>
+            <a:fillRect/>
+          </a:stretch>
+        </p:blipFill>
+        <p:spPr>
+          <a:xfrm>
+            <a:off x="0" y="1788483"/>
+            <a:ext cx="9144000" cy="4725423"/>
+          </a:xfrm>
+          <a:prstGeom prst="rect">
+            <a:avLst/>
+          </a:prstGeom>
+        </p:spPr>
+      </p:pic>
+      <p:sp>
+        <p:nvSpPr>
+          <p:cNvPr id="14" name="TextBox 13"/>
+          <p:cNvSpPr txBox="1"/>
+          <p:nvPr/>
+        </p:nvSpPr>
+        <p:spPr>
+          <a:xfrm>
+            <a:off x="5599436" y="1419151"/>
+            <a:ext cx="3385550" cy="369332"/>
+          </a:xfrm>
+          <a:prstGeom prst="rect">
+            <a:avLst/>
+          </a:prstGeom>
+          <a:noFill/>
+        </p:spPr>
+        <p:txBody>
+          <a:bodyPr wrap="none" rtlCol="0">
+            <a:spAutoFit/>
+          </a:bodyPr>
+          <a:lstStyle/>
+          <a:p>
+            <a:r>
+              <a:rPr lang="en-US" dirty="0" smtClean="0"/>
+              <a:t>Slope= -0.093, 95%CI: -0.23, 0.001</a:t>
+            </a:r>
+            <a:endParaRPr lang="en-US" dirty="0"/>
+          </a:p>
+        </p:txBody>
+      </p:sp>
+    </p:spTree>
+    <p:extLst>
+      <p:ext uri="{BB962C8B-B14F-4D97-AF65-F5344CB8AC3E}">
+        <p14:creationId xmlns:p14="http://schemas.microsoft.com/office/powerpoint/2010/main" val="3312664093"/>
+      </p:ext>
+    </p:extLst>
+  </p:cSld>
+  <p:clrMapOvr>
+    <a:masterClrMapping/>
+  </p:clrMapOvr>
+  <p:timing>
+    <p:tnLst>
+      <p:par>
+        <p:cTn xmlns:p14="http://schemas.microsoft.com/office/powerpoint/2010/main" id="1" dur="indefinite" restart="never" nodeType="tmRoot"/>
+      </p:par>
+    </p:tnLst>
+  </p:timing>
+</p:sld>
+</file>
+
+<file path=ppt/slides/slide20.xml><?xml version="1.0" encoding="utf-8"?>
 <p:sld xmlns:a="http://schemas.openxmlformats.org/drawingml/2006/main" xmlns:r="http://schemas.openxmlformats.org/officeDocument/2006/relationships" xmlns:p="http://schemas.openxmlformats.org/presentationml/2006/main">
   <p:cSld>
     <p:spTree>
@@ -5308,11 +6209,7 @@
           <a:p>
             <a:r>
               <a:rPr lang="en-US" sz="2800" dirty="0" smtClean="0"/>
-              <a:t>Test of mismatch hypothesis: when food is </a:t>
-            </a:r>
-            <a:r>
-              <a:rPr lang="en-US" sz="2800" dirty="0" smtClean="0"/>
-              <a:t>available</a:t>
+              <a:t>Test of mismatch hypothesis: when food is available</a:t>
             </a:r>
             <a:endParaRPr lang="en-US" sz="2800" dirty="0"/>
           </a:p>
@@ -5349,25 +6246,13 @@
           <a:p>
             <a:r>
               <a:rPr lang="en-US" sz="2400" dirty="0" smtClean="0"/>
-              <a:t>Slope=-</a:t>
-            </a:r>
+              <a:t>Slope=-0.02 z/days, </a:t>
+            </a:r>
+          </a:p>
+          <a:p>
             <a:r>
               <a:rPr lang="en-US" sz="2400" dirty="0" smtClean="0"/>
-              <a:t>0.02 z/days, </a:t>
-            </a:r>
-          </a:p>
-          <a:p>
-            <a:r>
-              <a:rPr lang="en-US" sz="2400" dirty="0" smtClean="0"/>
-              <a:t>95% CI </a:t>
-            </a:r>
-            <a:r>
-              <a:rPr lang="en-US" sz="2400" dirty="0" smtClean="0"/>
-              <a:t>-0.04 to -</a:t>
-            </a:r>
-            <a:r>
-              <a:rPr lang="en-US" sz="2400" dirty="0" smtClean="0"/>
-              <a:t>0.01 </a:t>
+              <a:t>95% CI -0.04 to -0.01 </a:t>
             </a:r>
             <a:endParaRPr lang="en-US" sz="2400" dirty="0"/>
           </a:p>
@@ -5428,7 +6313,6 @@
               <a:rPr lang="en-US" dirty="0"/>
               <a:t>(n=24 interactions)</a:t>
             </a:r>
-            <a:endParaRPr lang="en-US" dirty="0"/>
           </a:p>
         </p:txBody>
       </p:sp>
@@ -5659,7 +6543,7 @@
 </p:sld>
 </file>
 
-<file path=ppt/slides/slide2.xml><?xml version="1.0" encoding="utf-8"?>
+<file path=ppt/slides/slide3.xml><?xml version="1.0" encoding="utf-8"?>
 <p:sld xmlns:a="http://schemas.openxmlformats.org/drawingml/2006/main" xmlns:r="http://schemas.openxmlformats.org/officeDocument/2006/relationships" xmlns:p="http://schemas.openxmlformats.org/presentationml/2006/main">
   <p:cSld>
     <p:spTree>
@@ -5678,6 +6562,206 @@
       </p:grpSpPr>
       <p:sp>
         <p:nvSpPr>
+          <p:cNvPr id="6" name="TextBox 5"/>
+          <p:cNvSpPr txBox="1"/>
+          <p:nvPr/>
+        </p:nvSpPr>
+        <p:spPr>
+          <a:xfrm>
+            <a:off x="0" y="1142152"/>
+            <a:ext cx="5120963" cy="646331"/>
+          </a:xfrm>
+          <a:prstGeom prst="rect">
+            <a:avLst/>
+          </a:prstGeom>
+          <a:noFill/>
+        </p:spPr>
+        <p:txBody>
+          <a:bodyPr wrap="none" rtlCol="0">
+            <a:spAutoFit/>
+          </a:bodyPr>
+          <a:lstStyle/>
+          <a:p>
+            <a:r>
+              <a:rPr lang="en-US" dirty="0" smtClean="0"/>
+              <a:t>Linear term (mu_b1): -0.01 (-0.02, 0.002)</a:t>
+            </a:r>
+          </a:p>
+          <a:p>
+            <a:r>
+              <a:rPr lang="en-US" dirty="0" smtClean="0"/>
+              <a:t>Quadratic term (mu_b2)</a:t>
+            </a:r>
+            <a:r>
+              <a:rPr lang="en-US" dirty="0"/>
+              <a:t>: </a:t>
+            </a:r>
+            <a:r>
+              <a:rPr lang="en-US" dirty="0" smtClean="0"/>
+              <a:t>0.00006 (-0.0003, 0.00013)</a:t>
+            </a:r>
+          </a:p>
+        </p:txBody>
+      </p:sp>
+      <p:sp>
+        <p:nvSpPr>
+          <p:cNvPr id="7" name="TextBox 6"/>
+          <p:cNvSpPr txBox="1"/>
+          <p:nvPr/>
+        </p:nvSpPr>
+        <p:spPr>
+          <a:xfrm>
+            <a:off x="127000" y="86647"/>
+            <a:ext cx="7051730" cy="1077218"/>
+          </a:xfrm>
+          <a:prstGeom prst="rect">
+            <a:avLst/>
+          </a:prstGeom>
+          <a:noFill/>
+        </p:spPr>
+        <p:txBody>
+          <a:bodyPr wrap="none" rtlCol="0">
+            <a:spAutoFit/>
+          </a:bodyPr>
+          <a:lstStyle/>
+          <a:p>
+            <a:r>
+              <a:rPr lang="en-US" sz="3200" dirty="0" smtClean="0"/>
+              <a:t>Test of mismatch hypothesis: full picture</a:t>
+            </a:r>
+          </a:p>
+          <a:p>
+            <a:r>
+              <a:rPr lang="en-US" sz="3200" dirty="0" smtClean="0"/>
+              <a:t>**** NOT SURE HOW TO SHOW RESULTS</a:t>
+            </a:r>
+            <a:endParaRPr lang="en-US" sz="3200" dirty="0"/>
+          </a:p>
+        </p:txBody>
+      </p:sp>
+      <p:sp>
+        <p:nvSpPr>
+          <p:cNvPr id="10" name="TextBox 9"/>
+          <p:cNvSpPr txBox="1"/>
+          <p:nvPr/>
+        </p:nvSpPr>
+        <p:spPr>
+          <a:xfrm>
+            <a:off x="7292211" y="6469538"/>
+            <a:ext cx="1851789" cy="369332"/>
+          </a:xfrm>
+          <a:prstGeom prst="rect">
+            <a:avLst/>
+          </a:prstGeom>
+          <a:noFill/>
+        </p:spPr>
+        <p:txBody>
+          <a:bodyPr wrap="none" rtlCol="0">
+            <a:spAutoFit/>
+          </a:bodyPr>
+          <a:lstStyle/>
+          <a:p>
+            <a:r>
+              <a:rPr lang="en-US" dirty="0" smtClean="0"/>
+              <a:t>N=21 interactions</a:t>
+            </a:r>
+            <a:endParaRPr lang="en-US" dirty="0"/>
+          </a:p>
+        </p:txBody>
+      </p:sp>
+      <p:pic>
+        <p:nvPicPr>
+          <p:cNvPr id="13" name="Picture 12"/>
+          <p:cNvPicPr>
+            <a:picLocks noChangeAspect="1"/>
+          </p:cNvPicPr>
+          <p:nvPr/>
+        </p:nvPicPr>
+        <p:blipFill>
+          <a:blip r:embed="rId3"/>
+          <a:stretch>
+            <a:fillRect/>
+          </a:stretch>
+        </p:blipFill>
+        <p:spPr>
+          <a:xfrm>
+            <a:off x="0" y="1788483"/>
+            <a:ext cx="9144000" cy="4725423"/>
+          </a:xfrm>
+          <a:prstGeom prst="rect">
+            <a:avLst/>
+          </a:prstGeom>
+        </p:spPr>
+      </p:pic>
+      <p:sp>
+        <p:nvSpPr>
+          <p:cNvPr id="14" name="TextBox 13"/>
+          <p:cNvSpPr txBox="1"/>
+          <p:nvPr/>
+        </p:nvSpPr>
+        <p:spPr>
+          <a:xfrm>
+            <a:off x="5599436" y="1419151"/>
+            <a:ext cx="3385550" cy="369332"/>
+          </a:xfrm>
+          <a:prstGeom prst="rect">
+            <a:avLst/>
+          </a:prstGeom>
+          <a:noFill/>
+        </p:spPr>
+        <p:txBody>
+          <a:bodyPr wrap="none" rtlCol="0">
+            <a:spAutoFit/>
+          </a:bodyPr>
+          <a:lstStyle/>
+          <a:p>
+            <a:r>
+              <a:rPr lang="en-US" dirty="0" smtClean="0"/>
+              <a:t>Slope= -0.093, 95%CI: -0.23, 0.001</a:t>
+            </a:r>
+            <a:endParaRPr lang="en-US" dirty="0"/>
+          </a:p>
+        </p:txBody>
+      </p:sp>
+    </p:spTree>
+    <p:extLst>
+      <p:ext uri="{BB962C8B-B14F-4D97-AF65-F5344CB8AC3E}">
+        <p14:creationId xmlns:p14="http://schemas.microsoft.com/office/powerpoint/2010/main" val="785589313"/>
+      </p:ext>
+    </p:extLst>
+  </p:cSld>
+  <p:clrMapOvr>
+    <a:masterClrMapping/>
+  </p:clrMapOvr>
+  <p:timing>
+    <p:tnLst>
+      <p:par>
+        <p:cTn xmlns:p14="http://schemas.microsoft.com/office/powerpoint/2010/main" id="1" dur="indefinite" restart="never" nodeType="tmRoot"/>
+      </p:par>
+    </p:tnLst>
+  </p:timing>
+</p:sld>
+</file>
+
+<file path=ppt/slides/slide4.xml><?xml version="1.0" encoding="utf-8"?>
+<p:sld xmlns:a="http://schemas.openxmlformats.org/drawingml/2006/main" xmlns:r="http://schemas.openxmlformats.org/officeDocument/2006/relationships" xmlns:p="http://schemas.openxmlformats.org/presentationml/2006/main">
+  <p:cSld>
+    <p:spTree>
+      <p:nvGrpSpPr>
+        <p:cNvPr id="1" name=""/>
+        <p:cNvGrpSpPr/>
+        <p:nvPr/>
+      </p:nvGrpSpPr>
+      <p:grpSpPr>
+        <a:xfrm>
+          <a:off x="0" y="0"/>
+          <a:ext cx="0" cy="0"/>
+          <a:chOff x="0" y="0"/>
+          <a:chExt cx="0" cy="0"/>
+        </a:xfrm>
+      </p:grpSpPr>
+      <p:sp>
+        <p:nvSpPr>
           <p:cNvPr id="2" name="Title 1"/>
           <p:cNvSpPr>
             <a:spLocks noGrp="1"/>
@@ -5735,7 +6819,6 @@
               <a:rPr lang="en-US" dirty="0" smtClean="0"/>
               <a:t> during some of the year</a:t>
             </a:r>
-            <a:endParaRPr lang="en-US" dirty="0" smtClean="0"/>
           </a:p>
           <a:p>
             <a:r>
@@ -5756,16 +6839,11 @@
               <a:rPr lang="en-US" dirty="0" smtClean="0"/>
               <a:t>Aquatic- faster turnover (shorter life spans and multiple generations) so temporal sequencing unclear; timing is about biology relative to sampling window</a:t>
             </a:r>
-            <a:endParaRPr lang="en-US" dirty="0" smtClean="0"/>
           </a:p>
           <a:p>
             <a:r>
               <a:rPr lang="en-US" dirty="0" smtClean="0"/>
-              <a:t>Why </a:t>
-            </a:r>
-            <a:r>
-              <a:rPr lang="en-US" dirty="0" smtClean="0"/>
-              <a:t>its difficult  to evaluate overall and/or long-term consequences of mismatch</a:t>
+              <a:t>Why its difficult  to evaluate overall and/or long-term consequences of mismatch</a:t>
             </a:r>
           </a:p>
           <a:p>
@@ -5841,11 +6919,7 @@
           <a:p>
             <a:r>
               <a:rPr lang="en-US" dirty="0" smtClean="0"/>
-              <a:t>When is mismatch likely NOT to be important</a:t>
-            </a:r>
-            <a:r>
-              <a:rPr lang="en-US" dirty="0" smtClean="0"/>
-              <a:t>?</a:t>
+              <a:t>When is mismatch likely NOT to be important?</a:t>
             </a:r>
           </a:p>
           <a:p>
@@ -5854,7 +6928,6 @@
               <a:rPr lang="en-US" dirty="0" smtClean="0"/>
               <a:t>Stronger selection from abiotic conditions (direct effects) e.g. too cold, frost</a:t>
             </a:r>
-            <a:endParaRPr lang="en-US" dirty="0" smtClean="0"/>
           </a:p>
           <a:p>
             <a:pPr lvl="1"/>
@@ -5928,181 +7001,6 @@
 </p:sld>
 </file>
 
-<file path=ppt/slides/slide3.xml><?xml version="1.0" encoding="utf-8"?>
-<p:sld xmlns:a="http://schemas.openxmlformats.org/drawingml/2006/main" xmlns:r="http://schemas.openxmlformats.org/officeDocument/2006/relationships" xmlns:p="http://schemas.openxmlformats.org/presentationml/2006/main">
-  <p:cSld>
-    <p:spTree>
-      <p:nvGrpSpPr>
-        <p:cNvPr id="1" name=""/>
-        <p:cNvGrpSpPr/>
-        <p:nvPr/>
-      </p:nvGrpSpPr>
-      <p:grpSpPr>
-        <a:xfrm>
-          <a:off x="0" y="0"/>
-          <a:ext cx="0" cy="0"/>
-          <a:chOff x="0" y="0"/>
-          <a:chExt cx="0" cy="0"/>
-        </a:xfrm>
-      </p:grpSpPr>
-      <p:sp>
-        <p:nvSpPr>
-          <p:cNvPr id="4" name="TextBox 3"/>
-          <p:cNvSpPr txBox="1"/>
-          <p:nvPr/>
-        </p:nvSpPr>
-        <p:spPr>
-          <a:xfrm>
-            <a:off x="643986" y="381863"/>
-            <a:ext cx="1939954" cy="584776"/>
-          </a:xfrm>
-          <a:prstGeom prst="rect">
-            <a:avLst/>
-          </a:prstGeom>
-          <a:noFill/>
-        </p:spPr>
-        <p:txBody>
-          <a:bodyPr wrap="none" rtlCol="0">
-            <a:spAutoFit/>
-          </a:bodyPr>
-          <a:lstStyle/>
-          <a:p>
-            <a:r>
-              <a:rPr lang="en-US" sz="3200" dirty="0" smtClean="0"/>
-              <a:t>Next steps</a:t>
-            </a:r>
-            <a:endParaRPr lang="en-US" sz="3200" dirty="0"/>
-          </a:p>
-        </p:txBody>
-      </p:sp>
-      <p:sp>
-        <p:nvSpPr>
-          <p:cNvPr id="5" name="TextBox 4"/>
-          <p:cNvSpPr txBox="1"/>
-          <p:nvPr/>
-        </p:nvSpPr>
-        <p:spPr>
-          <a:xfrm>
-            <a:off x="1078777" y="1802401"/>
-            <a:ext cx="5523342" cy="646331"/>
-          </a:xfrm>
-          <a:prstGeom prst="rect">
-            <a:avLst/>
-          </a:prstGeom>
-          <a:noFill/>
-        </p:spPr>
-        <p:txBody>
-          <a:bodyPr wrap="none" rtlCol="0">
-            <a:spAutoFit/>
-          </a:bodyPr>
-          <a:lstStyle/>
-          <a:p>
-            <a:r>
-              <a:rPr lang="en-US" dirty="0" smtClean="0"/>
-              <a:t>Experiments</a:t>
-            </a:r>
-          </a:p>
-          <a:p>
-            <a:r>
-              <a:rPr lang="en-US" dirty="0" smtClean="0"/>
-              <a:t>Further exploration of ‘match’ in individual study systems</a:t>
-            </a:r>
-            <a:endParaRPr lang="en-US" dirty="0"/>
-          </a:p>
-        </p:txBody>
-      </p:sp>
-    </p:spTree>
-    <p:extLst>
-      <p:ext uri="{BB962C8B-B14F-4D97-AF65-F5344CB8AC3E}">
-        <p14:creationId xmlns:p14="http://schemas.microsoft.com/office/powerpoint/2010/main" val="925707128"/>
-      </p:ext>
-    </p:extLst>
-  </p:cSld>
-  <p:clrMapOvr>
-    <a:masterClrMapping/>
-  </p:clrMapOvr>
-</p:sld>
-</file>
-
-<file path=ppt/slides/slide4.xml><?xml version="1.0" encoding="utf-8"?>
-<p:sld xmlns:a="http://schemas.openxmlformats.org/drawingml/2006/main" xmlns:r="http://schemas.openxmlformats.org/officeDocument/2006/relationships" xmlns:p="http://schemas.openxmlformats.org/presentationml/2006/main">
-  <p:cSld>
-    <p:spTree>
-      <p:nvGrpSpPr>
-        <p:cNvPr id="1" name=""/>
-        <p:cNvGrpSpPr/>
-        <p:nvPr/>
-      </p:nvGrpSpPr>
-      <p:grpSpPr>
-        <a:xfrm>
-          <a:off x="0" y="0"/>
-          <a:ext cx="0" cy="0"/>
-          <a:chOff x="0" y="0"/>
-          <a:chExt cx="0" cy="0"/>
-        </a:xfrm>
-      </p:grpSpPr>
-      <p:sp>
-        <p:nvSpPr>
-          <p:cNvPr id="3" name="Content Placeholder 2"/>
-          <p:cNvSpPr>
-            <a:spLocks noGrp="1"/>
-          </p:cNvSpPr>
-          <p:nvPr>
-            <p:ph idx="1"/>
-          </p:nvPr>
-        </p:nvSpPr>
-        <p:spPr/>
-        <p:txBody>
-          <a:bodyPr/>
-          <a:lstStyle/>
-          <a:p>
-            <a:r>
-              <a:rPr lang="en-US" dirty="0" smtClean="0"/>
-              <a:t>Need to read:</a:t>
-            </a:r>
-          </a:p>
-          <a:p>
-            <a:pPr lvl="1"/>
-            <a:r>
-              <a:rPr lang="en-US" dirty="0" smtClean="0"/>
-              <a:t>Thackeray 2012- mismatching revisited: what is trophic mismatching from the perspective of the plankton</a:t>
-            </a:r>
-            <a:endParaRPr lang="en-US" dirty="0"/>
-          </a:p>
-        </p:txBody>
-      </p:sp>
-      <p:sp>
-        <p:nvSpPr>
-          <p:cNvPr id="4" name="Title 3"/>
-          <p:cNvSpPr>
-            <a:spLocks noGrp="1"/>
-          </p:cNvSpPr>
-          <p:nvPr>
-            <p:ph type="title"/>
-          </p:nvPr>
-        </p:nvSpPr>
-        <p:spPr/>
-        <p:txBody>
-          <a:bodyPr/>
-          <a:lstStyle/>
-          <a:p>
-            <a:endParaRPr lang="en-US"/>
-          </a:p>
-        </p:txBody>
-      </p:sp>
-    </p:spTree>
-    <p:extLst>
-      <p:ext uri="{BB962C8B-B14F-4D97-AF65-F5344CB8AC3E}">
-        <p14:creationId xmlns:p14="http://schemas.microsoft.com/office/powerpoint/2010/main" val="263997310"/>
-      </p:ext>
-    </p:extLst>
-  </p:cSld>
-  <p:clrMapOvr>
-    <a:masterClrMapping/>
-  </p:clrMapOvr>
-</p:sld>
-</file>
-
 <file path=ppt/slides/slide5.xml><?xml version="1.0" encoding="utf-8"?>
 <p:sld xmlns:a="http://schemas.openxmlformats.org/drawingml/2006/main" xmlns:r="http://schemas.openxmlformats.org/officeDocument/2006/relationships" xmlns:p="http://schemas.openxmlformats.org/presentationml/2006/main">
   <p:cSld>
@@ -6122,73 +7020,74 @@
       </p:grpSpPr>
       <p:sp>
         <p:nvSpPr>
-          <p:cNvPr id="2" name="Title 1"/>
-          <p:cNvSpPr>
-            <a:spLocks noGrp="1"/>
-          </p:cNvSpPr>
-          <p:nvPr>
-            <p:ph type="title"/>
-          </p:nvPr>
-        </p:nvSpPr>
-        <p:spPr/>
-        <p:txBody>
-          <a:bodyPr/>
-          <a:lstStyle/>
-          <a:p>
-            <a:endParaRPr lang="en-US"/>
-          </a:p>
-        </p:txBody>
-      </p:sp>
-      <p:sp>
-        <p:nvSpPr>
-          <p:cNvPr id="3" name="Content Placeholder 2"/>
-          <p:cNvSpPr>
-            <a:spLocks noGrp="1"/>
-          </p:cNvSpPr>
-          <p:nvPr>
-            <p:ph idx="1"/>
-          </p:nvPr>
-        </p:nvSpPr>
-        <p:spPr/>
-        <p:txBody>
-          <a:bodyPr/>
-          <a:lstStyle/>
-          <a:p>
-            <a:r>
-              <a:rPr lang="en-US" dirty="0"/>
-              <a:t>Cushing (1990) refined the ‘‘match–mismatch’’ hypothesis for </a:t>
-            </a:r>
+          <p:cNvPr id="4" name="TextBox 3"/>
+          <p:cNvSpPr txBox="1"/>
+          <p:nvPr/>
+        </p:nvSpPr>
+        <p:spPr>
+          <a:xfrm>
+            <a:off x="643986" y="381863"/>
+            <a:ext cx="1939954" cy="584776"/>
+          </a:xfrm>
+          <a:prstGeom prst="rect">
+            <a:avLst/>
+          </a:prstGeom>
+          <a:noFill/>
+        </p:spPr>
+        <p:txBody>
+          <a:bodyPr wrap="none" rtlCol="0">
+            <a:spAutoFit/>
+          </a:bodyPr>
+          <a:lstStyle/>
+          <a:p>
+            <a:r>
+              <a:rPr lang="en-US" sz="3200" dirty="0" smtClean="0"/>
+              <a:t>Next steps</a:t>
+            </a:r>
+            <a:endParaRPr lang="en-US" sz="3200" dirty="0"/>
+          </a:p>
+        </p:txBody>
+      </p:sp>
+      <p:sp>
+        <p:nvSpPr>
+          <p:cNvPr id="5" name="TextBox 4"/>
+          <p:cNvSpPr txBox="1"/>
+          <p:nvPr/>
+        </p:nvSpPr>
+        <p:spPr>
+          <a:xfrm>
+            <a:off x="1078777" y="1802401"/>
+            <a:ext cx="5523342" cy="646331"/>
+          </a:xfrm>
+          <a:prstGeom prst="rect">
+            <a:avLst/>
+          </a:prstGeom>
+          <a:noFill/>
+        </p:spPr>
+        <p:txBody>
+          <a:bodyPr wrap="none" rtlCol="0">
+            <a:spAutoFit/>
+          </a:bodyPr>
+          <a:lstStyle/>
+          <a:p>
             <a:r>
               <a:rPr lang="en-US" dirty="0" smtClean="0"/>
-              <a:t>marine fish</a:t>
-            </a:r>
-            <a:r>
-              <a:rPr lang="en-US" dirty="0"/>
-              <a:t>, whose spawning within a relatively narrow time </a:t>
-            </a:r>
+              <a:t>Experiments</a:t>
+            </a:r>
+          </a:p>
+          <a:p>
             <a:r>
               <a:rPr lang="en-US" dirty="0" smtClean="0"/>
-              <a:t>window was </a:t>
-            </a:r>
-            <a:r>
-              <a:rPr lang="en-US" dirty="0"/>
-              <a:t>suggested to lead to their larvae either matching or </a:t>
-            </a:r>
-            <a:r>
-              <a:rPr lang="en-US" dirty="0" smtClean="0"/>
-              <a:t>missing the </a:t>
-            </a:r>
-            <a:r>
-              <a:rPr lang="en-US" dirty="0"/>
-              <a:t>subsequent peak of their zooplankton food</a:t>
-            </a:r>
+              <a:t>Further exploration of ‘match’ in individual study systems</a:t>
+            </a:r>
+            <a:endParaRPr lang="en-US" dirty="0"/>
           </a:p>
         </p:txBody>
       </p:sp>
     </p:spTree>
     <p:extLst>
       <p:ext uri="{BB962C8B-B14F-4D97-AF65-F5344CB8AC3E}">
-        <p14:creationId xmlns:p14="http://schemas.microsoft.com/office/powerpoint/2010/main" val="584011104"/>
+        <p14:creationId xmlns:p14="http://schemas.microsoft.com/office/powerpoint/2010/main" val="925707128"/>
       </p:ext>
     </p:extLst>
   </p:cSld>
@@ -6217,6 +7116,180 @@
       </p:grpSpPr>
       <p:sp>
         <p:nvSpPr>
+          <p:cNvPr id="3" name="Content Placeholder 2"/>
+          <p:cNvSpPr>
+            <a:spLocks noGrp="1"/>
+          </p:cNvSpPr>
+          <p:nvPr>
+            <p:ph idx="1"/>
+          </p:nvPr>
+        </p:nvSpPr>
+        <p:spPr/>
+        <p:txBody>
+          <a:bodyPr/>
+          <a:lstStyle/>
+          <a:p>
+            <a:r>
+              <a:rPr lang="en-US" dirty="0" smtClean="0"/>
+              <a:t>Need to read:</a:t>
+            </a:r>
+          </a:p>
+          <a:p>
+            <a:pPr lvl="1"/>
+            <a:r>
+              <a:rPr lang="en-US" dirty="0" smtClean="0"/>
+              <a:t>Thackeray 2012- mismatching revisited: what is trophic mismatching from the perspective of the plankton</a:t>
+            </a:r>
+            <a:endParaRPr lang="en-US" dirty="0"/>
+          </a:p>
+        </p:txBody>
+      </p:sp>
+      <p:sp>
+        <p:nvSpPr>
+          <p:cNvPr id="4" name="Title 3"/>
+          <p:cNvSpPr>
+            <a:spLocks noGrp="1"/>
+          </p:cNvSpPr>
+          <p:nvPr>
+            <p:ph type="title"/>
+          </p:nvPr>
+        </p:nvSpPr>
+        <p:spPr/>
+        <p:txBody>
+          <a:bodyPr/>
+          <a:lstStyle/>
+          <a:p>
+            <a:endParaRPr lang="en-US"/>
+          </a:p>
+        </p:txBody>
+      </p:sp>
+    </p:spTree>
+    <p:extLst>
+      <p:ext uri="{BB962C8B-B14F-4D97-AF65-F5344CB8AC3E}">
+        <p14:creationId xmlns:p14="http://schemas.microsoft.com/office/powerpoint/2010/main" val="263997310"/>
+      </p:ext>
+    </p:extLst>
+  </p:cSld>
+  <p:clrMapOvr>
+    <a:masterClrMapping/>
+  </p:clrMapOvr>
+</p:sld>
+</file>
+
+<file path=ppt/slides/slide7.xml><?xml version="1.0" encoding="utf-8"?>
+<p:sld xmlns:a="http://schemas.openxmlformats.org/drawingml/2006/main" xmlns:r="http://schemas.openxmlformats.org/officeDocument/2006/relationships" xmlns:p="http://schemas.openxmlformats.org/presentationml/2006/main">
+  <p:cSld>
+    <p:spTree>
+      <p:nvGrpSpPr>
+        <p:cNvPr id="1" name=""/>
+        <p:cNvGrpSpPr/>
+        <p:nvPr/>
+      </p:nvGrpSpPr>
+      <p:grpSpPr>
+        <a:xfrm>
+          <a:off x="0" y="0"/>
+          <a:ext cx="0" cy="0"/>
+          <a:chOff x="0" y="0"/>
+          <a:chExt cx="0" cy="0"/>
+        </a:xfrm>
+      </p:grpSpPr>
+      <p:sp>
+        <p:nvSpPr>
+          <p:cNvPr id="2" name="Title 1"/>
+          <p:cNvSpPr>
+            <a:spLocks noGrp="1"/>
+          </p:cNvSpPr>
+          <p:nvPr>
+            <p:ph type="title"/>
+          </p:nvPr>
+        </p:nvSpPr>
+        <p:spPr/>
+        <p:txBody>
+          <a:bodyPr/>
+          <a:lstStyle/>
+          <a:p>
+            <a:endParaRPr lang="en-US"/>
+          </a:p>
+        </p:txBody>
+      </p:sp>
+      <p:sp>
+        <p:nvSpPr>
+          <p:cNvPr id="3" name="Content Placeholder 2"/>
+          <p:cNvSpPr>
+            <a:spLocks noGrp="1"/>
+          </p:cNvSpPr>
+          <p:nvPr>
+            <p:ph idx="1"/>
+          </p:nvPr>
+        </p:nvSpPr>
+        <p:spPr/>
+        <p:txBody>
+          <a:bodyPr/>
+          <a:lstStyle/>
+          <a:p>
+            <a:r>
+              <a:rPr lang="en-US" dirty="0"/>
+              <a:t>Cushing (1990) refined the ‘‘match–mismatch’’ hypothesis for </a:t>
+            </a:r>
+            <a:r>
+              <a:rPr lang="en-US" dirty="0" smtClean="0"/>
+              <a:t>marine fish</a:t>
+            </a:r>
+            <a:r>
+              <a:rPr lang="en-US" dirty="0"/>
+              <a:t>, whose spawning within a relatively narrow time </a:t>
+            </a:r>
+            <a:r>
+              <a:rPr lang="en-US" dirty="0" smtClean="0"/>
+              <a:t>window was </a:t>
+            </a:r>
+            <a:r>
+              <a:rPr lang="en-US" dirty="0"/>
+              <a:t>suggested to lead to their larvae either matching or </a:t>
+            </a:r>
+            <a:r>
+              <a:rPr lang="en-US" dirty="0" smtClean="0"/>
+              <a:t>missing the </a:t>
+            </a:r>
+            <a:r>
+              <a:rPr lang="en-US" dirty="0"/>
+              <a:t>subsequent peak of their zooplankton food</a:t>
+            </a:r>
+          </a:p>
+        </p:txBody>
+      </p:sp>
+    </p:spTree>
+    <p:extLst>
+      <p:ext uri="{BB962C8B-B14F-4D97-AF65-F5344CB8AC3E}">
+        <p14:creationId xmlns:p14="http://schemas.microsoft.com/office/powerpoint/2010/main" val="584011104"/>
+      </p:ext>
+    </p:extLst>
+  </p:cSld>
+  <p:clrMapOvr>
+    <a:masterClrMapping/>
+  </p:clrMapOvr>
+</p:sld>
+</file>
+
+<file path=ppt/slides/slide8.xml><?xml version="1.0" encoding="utf-8"?>
+<p:sld xmlns:a="http://schemas.openxmlformats.org/drawingml/2006/main" xmlns:r="http://schemas.openxmlformats.org/officeDocument/2006/relationships" xmlns:p="http://schemas.openxmlformats.org/presentationml/2006/main">
+  <p:cSld>
+    <p:spTree>
+      <p:nvGrpSpPr>
+        <p:cNvPr id="1" name=""/>
+        <p:cNvGrpSpPr/>
+        <p:nvPr/>
+      </p:nvGrpSpPr>
+      <p:grpSpPr>
+        <a:xfrm>
+          <a:off x="0" y="0"/>
+          <a:ext cx="0" cy="0"/>
+          <a:chOff x="0" y="0"/>
+          <a:chExt cx="0" cy="0"/>
+        </a:xfrm>
+      </p:grpSpPr>
+      <p:sp>
+        <p:nvSpPr>
           <p:cNvPr id="2" name="Title 1"/>
           <p:cNvSpPr>
             <a:spLocks noGrp="1"/>
@@ -6290,7 +7363,7 @@
 </p:sld>
 </file>
 
-<file path=ppt/slides/slide7.xml><?xml version="1.0" encoding="utf-8"?>
+<file path=ppt/slides/slide9.xml><?xml version="1.0" encoding="utf-8"?>
 <p:sld xmlns:a="http://schemas.openxmlformats.org/drawingml/2006/main" xmlns:r="http://schemas.openxmlformats.org/officeDocument/2006/relationships" xmlns:p="http://schemas.openxmlformats.org/presentationml/2006/main">
   <p:cSld>
     <p:spTree>
@@ -6686,15 +7759,7 @@
           <a:p>
             <a:r>
               <a:rPr lang="en-US" sz="3600" dirty="0" smtClean="0"/>
-              <a:t>Match-mismatch </a:t>
-            </a:r>
-            <a:r>
-              <a:rPr lang="en-US" sz="3600" dirty="0" smtClean="0"/>
-              <a:t>hypothesis (Cushing 1969)</a:t>
-            </a:r>
-            <a:r>
-              <a:rPr lang="en-US" sz="3600" dirty="0" smtClean="0"/>
-              <a:t>	</a:t>
+              <a:t>Match-mismatch hypothesis (Cushing 1969)	</a:t>
             </a:r>
             <a:r>
               <a:rPr lang="en-US" dirty="0" smtClean="0"/>
@@ -6999,453 +8064,6 @@
       </p:par>
     </p:tnLst>
   </p:timing>
-</p:sld>
-</file>
-
-<file path=ppt/slides/slide8.xml><?xml version="1.0" encoding="utf-8"?>
-<p:sld xmlns:a="http://schemas.openxmlformats.org/drawingml/2006/main" xmlns:r="http://schemas.openxmlformats.org/officeDocument/2006/relationships" xmlns:p="http://schemas.openxmlformats.org/presentationml/2006/main">
-  <p:cSld>
-    <p:spTree>
-      <p:nvGrpSpPr>
-        <p:cNvPr id="1" name=""/>
-        <p:cNvGrpSpPr/>
-        <p:nvPr/>
-      </p:nvGrpSpPr>
-      <p:grpSpPr>
-        <a:xfrm>
-          <a:off x="0" y="0"/>
-          <a:ext cx="0" cy="0"/>
-          <a:chOff x="0" y="0"/>
-          <a:chExt cx="0" cy="0"/>
-        </a:xfrm>
-      </p:grpSpPr>
-      <p:sp>
-        <p:nvSpPr>
-          <p:cNvPr id="3" name="Content Placeholder 2"/>
-          <p:cNvSpPr>
-            <a:spLocks noGrp="1"/>
-          </p:cNvSpPr>
-          <p:nvPr>
-            <p:ph idx="1"/>
-          </p:nvPr>
-        </p:nvSpPr>
-        <p:spPr>
-          <a:xfrm>
-            <a:off x="656113" y="2470934"/>
-            <a:ext cx="8229600" cy="4525963"/>
-          </a:xfrm>
-        </p:spPr>
-        <p:txBody>
-          <a:bodyPr>
-            <a:normAutofit/>
-          </a:bodyPr>
-          <a:lstStyle/>
-          <a:p>
-            <a:r>
-              <a:rPr lang="en-US" sz="2800" dirty="0"/>
-              <a:t>T</a:t>
-            </a:r>
-            <a:r>
-              <a:rPr lang="en-US" sz="2800" dirty="0" smtClean="0"/>
-              <a:t>ime-based (i.e. operational, not based on fitness)</a:t>
-            </a:r>
-          </a:p>
-          <a:p>
-            <a:r>
-              <a:rPr lang="en-US" sz="2800" dirty="0" smtClean="0"/>
-              <a:t>Units had to be days</a:t>
-            </a:r>
-            <a:endParaRPr lang="en-US" sz="2800" dirty="0" smtClean="0"/>
-          </a:p>
-          <a:p>
-            <a:r>
-              <a:rPr lang="en-US" sz="2800" dirty="0" smtClean="0"/>
-              <a:t>Used </a:t>
-            </a:r>
-            <a:r>
-              <a:rPr lang="en-US" sz="2800" dirty="0" err="1" smtClean="0"/>
-              <a:t>phenological</a:t>
-            </a:r>
-            <a:r>
-              <a:rPr lang="en-US" sz="2800" dirty="0" smtClean="0"/>
-              <a:t> phases used by authors</a:t>
-            </a:r>
-          </a:p>
-          <a:p>
-            <a:r>
-              <a:rPr lang="en-US" sz="2800" dirty="0" smtClean="0"/>
-              <a:t>To s</a:t>
-            </a:r>
-            <a:r>
-              <a:rPr lang="en-US" sz="2800" dirty="0" smtClean="0"/>
-              <a:t>tandardize mismatch: </a:t>
-            </a:r>
-          </a:p>
-          <a:p>
-            <a:pPr lvl="1"/>
-            <a:r>
-              <a:rPr lang="en-US" dirty="0" smtClean="0"/>
-              <a:t>larger values= events occur further apart</a:t>
-            </a:r>
-          </a:p>
-          <a:p>
-            <a:pPr lvl="1"/>
-            <a:r>
-              <a:rPr lang="en-US" dirty="0" smtClean="0"/>
-              <a:t>1</a:t>
-            </a:r>
-            <a:r>
-              <a:rPr lang="en-US" baseline="30000" dirty="0" smtClean="0"/>
-              <a:t>st</a:t>
-            </a:r>
-            <a:r>
-              <a:rPr lang="en-US" dirty="0" smtClean="0"/>
-              <a:t> approach: Isolated time period to when food was available- consumer emerged after resource</a:t>
-            </a:r>
-          </a:p>
-          <a:p>
-            <a:pPr lvl="1"/>
-            <a:r>
-              <a:rPr lang="en-US" dirty="0" smtClean="0"/>
-              <a:t>2</a:t>
-            </a:r>
-            <a:r>
-              <a:rPr lang="en-US" baseline="30000" dirty="0" smtClean="0"/>
-              <a:t>nd</a:t>
-            </a:r>
-            <a:r>
-              <a:rPr lang="en-US" dirty="0" smtClean="0"/>
-              <a:t> approach: </a:t>
-            </a:r>
-            <a:r>
-              <a:rPr lang="en-US" dirty="0" smtClean="0"/>
-              <a:t>true test- is there a perfect match?</a:t>
-            </a:r>
-            <a:endParaRPr lang="en-US" dirty="0" smtClean="0"/>
-          </a:p>
-          <a:p>
-            <a:endParaRPr lang="en-US" dirty="0" smtClean="0"/>
-          </a:p>
-        </p:txBody>
-      </p:sp>
-      <p:sp>
-        <p:nvSpPr>
-          <p:cNvPr id="4" name="TextBox 3"/>
-          <p:cNvSpPr txBox="1"/>
-          <p:nvPr/>
-        </p:nvSpPr>
-        <p:spPr>
-          <a:xfrm>
-            <a:off x="643986" y="381863"/>
-            <a:ext cx="5895364" cy="584776"/>
-          </a:xfrm>
-          <a:prstGeom prst="rect">
-            <a:avLst/>
-          </a:prstGeom>
-          <a:noFill/>
-        </p:spPr>
-        <p:txBody>
-          <a:bodyPr wrap="none" rtlCol="0">
-            <a:spAutoFit/>
-          </a:bodyPr>
-          <a:lstStyle/>
-          <a:p>
-            <a:r>
-              <a:rPr lang="en-US" sz="3200" dirty="0" smtClean="0"/>
-              <a:t>Defining mismatch: First approach </a:t>
-            </a:r>
-            <a:endParaRPr lang="en-US" sz="3200" dirty="0"/>
-          </a:p>
-        </p:txBody>
-      </p:sp>
-      <p:pic>
-        <p:nvPicPr>
-          <p:cNvPr id="8" name="Picture 7"/>
-          <p:cNvPicPr>
-            <a:picLocks noChangeAspect="1"/>
-          </p:cNvPicPr>
-          <p:nvPr/>
-        </p:nvPicPr>
-        <p:blipFill rotWithShape="1">
-          <a:blip r:embed="rId2"/>
-          <a:srcRect t="86532" r="-5336"/>
-          <a:stretch/>
-        </p:blipFill>
-        <p:spPr>
-          <a:xfrm>
-            <a:off x="878568" y="1328610"/>
-            <a:ext cx="7852681" cy="836387"/>
-          </a:xfrm>
-          <a:prstGeom prst="rect">
-            <a:avLst/>
-          </a:prstGeom>
-          <a:ln>
-            <a:solidFill>
-              <a:srgbClr val="000000"/>
-            </a:solidFill>
-          </a:ln>
-        </p:spPr>
-      </p:pic>
-      <p:sp>
-        <p:nvSpPr>
-          <p:cNvPr id="2" name="Rectangle 1"/>
-          <p:cNvSpPr/>
-          <p:nvPr/>
-        </p:nvSpPr>
-        <p:spPr>
-          <a:xfrm>
-            <a:off x="4889500" y="1328610"/>
-            <a:ext cx="3841749" cy="836387"/>
-          </a:xfrm>
-          <a:prstGeom prst="rect">
-            <a:avLst/>
-          </a:prstGeom>
-        </p:spPr>
-        <p:style>
-          <a:lnRef idx="1">
-            <a:schemeClr val="accent1"/>
-          </a:lnRef>
-          <a:fillRef idx="3">
-            <a:schemeClr val="accent1"/>
-          </a:fillRef>
-          <a:effectRef idx="2">
-            <a:schemeClr val="accent1"/>
-          </a:effectRef>
-          <a:fontRef idx="minor">
-            <a:schemeClr val="lt1"/>
-          </a:fontRef>
-        </p:style>
-        <p:txBody>
-          <a:bodyPr rtlCol="0" anchor="ctr"/>
-          <a:lstStyle/>
-          <a:p>
-            <a:pPr algn="ctr"/>
-            <a:endParaRPr lang="en-US"/>
-          </a:p>
-        </p:txBody>
-      </p:sp>
-    </p:spTree>
-    <p:extLst>
-      <p:ext uri="{BB962C8B-B14F-4D97-AF65-F5344CB8AC3E}">
-        <p14:creationId xmlns:p14="http://schemas.microsoft.com/office/powerpoint/2010/main" val="3333850739"/>
-      </p:ext>
-    </p:extLst>
-  </p:cSld>
-  <p:clrMapOvr>
-    <a:masterClrMapping/>
-  </p:clrMapOvr>
-</p:sld>
-</file>
-
-<file path=ppt/slides/slide9.xml><?xml version="1.0" encoding="utf-8"?>
-<p:sld xmlns:a="http://schemas.openxmlformats.org/drawingml/2006/main" xmlns:r="http://schemas.openxmlformats.org/officeDocument/2006/relationships" xmlns:p="http://schemas.openxmlformats.org/presentationml/2006/main">
-  <p:cSld>
-    <p:spTree>
-      <p:nvGrpSpPr>
-        <p:cNvPr id="1" name=""/>
-        <p:cNvGrpSpPr/>
-        <p:nvPr/>
-      </p:nvGrpSpPr>
-      <p:grpSpPr>
-        <a:xfrm>
-          <a:off x="0" y="0"/>
-          <a:ext cx="0" cy="0"/>
-          <a:chOff x="0" y="0"/>
-          <a:chExt cx="0" cy="0"/>
-        </a:xfrm>
-      </p:grpSpPr>
-      <p:sp>
-        <p:nvSpPr>
-          <p:cNvPr id="4" name="TextBox 3"/>
-          <p:cNvSpPr txBox="1"/>
-          <p:nvPr/>
-        </p:nvSpPr>
-        <p:spPr>
-          <a:xfrm>
-            <a:off x="127000" y="86647"/>
-            <a:ext cx="7338780" cy="369332"/>
-          </a:xfrm>
-          <a:prstGeom prst="rect">
-            <a:avLst/>
-          </a:prstGeom>
-          <a:noFill/>
-        </p:spPr>
-        <p:txBody>
-          <a:bodyPr wrap="none" rtlCol="0">
-            <a:spAutoFit/>
-          </a:bodyPr>
-          <a:lstStyle/>
-          <a:p>
-            <a:r>
-              <a:rPr lang="en-US" dirty="0" smtClean="0"/>
-              <a:t>Test of mismatch hypothesis: when food is </a:t>
-            </a:r>
-            <a:r>
-              <a:rPr lang="en-US" dirty="0" smtClean="0"/>
-              <a:t>available=</a:t>
-            </a:r>
-            <a:r>
-              <a:rPr lang="en-US" dirty="0" smtClean="0"/>
-              <a:t>&gt; </a:t>
-            </a:r>
-            <a:r>
-              <a:rPr lang="en-US" dirty="0" smtClean="0"/>
-              <a:t>terrestrial </a:t>
-            </a:r>
-            <a:r>
-              <a:rPr lang="en-US" dirty="0" err="1" smtClean="0"/>
-              <a:t>vs</a:t>
-            </a:r>
-            <a:r>
-              <a:rPr lang="en-US" dirty="0" smtClean="0"/>
-              <a:t> aquatic</a:t>
-            </a:r>
-            <a:endParaRPr lang="en-US" dirty="0"/>
-          </a:p>
-        </p:txBody>
-      </p:sp>
-      <p:sp>
-        <p:nvSpPr>
-          <p:cNvPr id="2" name="TextBox 1"/>
-          <p:cNvSpPr txBox="1"/>
-          <p:nvPr/>
-        </p:nvSpPr>
-        <p:spPr>
-          <a:xfrm>
-            <a:off x="5263931" y="709448"/>
-            <a:ext cx="2231726" cy="1200329"/>
-          </a:xfrm>
-          <a:prstGeom prst="rect">
-            <a:avLst/>
-          </a:prstGeom>
-          <a:noFill/>
-        </p:spPr>
-        <p:txBody>
-          <a:bodyPr wrap="none" rtlCol="0">
-            <a:spAutoFit/>
-          </a:bodyPr>
-          <a:lstStyle/>
-          <a:p>
-            <a:r>
-              <a:rPr lang="en-US" dirty="0" smtClean="0"/>
-              <a:t>Aquatic: n=17</a:t>
-            </a:r>
-          </a:p>
-          <a:p>
-            <a:r>
-              <a:rPr lang="en-US" dirty="0" smtClean="0"/>
-              <a:t>slope= </a:t>
-            </a:r>
-            <a:r>
-              <a:rPr lang="en-US" dirty="0"/>
-              <a:t>-0.02 (-0.04, 0</a:t>
-            </a:r>
-            <a:r>
-              <a:rPr lang="en-US" dirty="0" smtClean="0"/>
-              <a:t>)</a:t>
-            </a:r>
-          </a:p>
-          <a:p>
-            <a:endParaRPr lang="en-US" dirty="0"/>
-          </a:p>
-          <a:p>
-            <a:endParaRPr lang="en-US" dirty="0"/>
-          </a:p>
-        </p:txBody>
-      </p:sp>
-      <p:pic>
-        <p:nvPicPr>
-          <p:cNvPr id="5" name="Picture 4"/>
-          <p:cNvPicPr>
-            <a:picLocks noChangeAspect="1"/>
-          </p:cNvPicPr>
-          <p:nvPr/>
-        </p:nvPicPr>
-        <p:blipFill>
-          <a:blip r:embed="rId2"/>
-          <a:stretch>
-            <a:fillRect/>
-          </a:stretch>
-        </p:blipFill>
-        <p:spPr>
-          <a:xfrm>
-            <a:off x="0" y="1738149"/>
-            <a:ext cx="4775200" cy="4800600"/>
-          </a:xfrm>
-          <a:prstGeom prst="rect">
-            <a:avLst/>
-          </a:prstGeom>
-        </p:spPr>
-      </p:pic>
-      <p:sp>
-        <p:nvSpPr>
-          <p:cNvPr id="7" name="Rectangle 6"/>
-          <p:cNvSpPr/>
-          <p:nvPr/>
-        </p:nvSpPr>
-        <p:spPr>
-          <a:xfrm>
-            <a:off x="621862" y="1097101"/>
-            <a:ext cx="4572000" cy="646331"/>
-          </a:xfrm>
-          <a:prstGeom prst="rect">
-            <a:avLst/>
-          </a:prstGeom>
-        </p:spPr>
-        <p:txBody>
-          <a:bodyPr>
-            <a:spAutoFit/>
-          </a:bodyPr>
-          <a:lstStyle/>
-          <a:p>
-            <a:r>
-              <a:rPr lang="en-US" dirty="0"/>
-              <a:t>Terrestrial: n=7</a:t>
-            </a:r>
-          </a:p>
-          <a:p>
-            <a:r>
-              <a:rPr lang="en-US" dirty="0"/>
-              <a:t>Slope=-0.04 (-0.10 to 0.03)</a:t>
-            </a:r>
-            <a:endParaRPr lang="en-US" dirty="0"/>
-          </a:p>
-        </p:txBody>
-      </p:sp>
-      <p:pic>
-        <p:nvPicPr>
-          <p:cNvPr id="9" name="Picture 8"/>
-          <p:cNvPicPr>
-            <a:picLocks noChangeAspect="1"/>
-          </p:cNvPicPr>
-          <p:nvPr/>
-        </p:nvPicPr>
-        <p:blipFill>
-          <a:blip r:embed="rId3"/>
-          <a:stretch>
-            <a:fillRect/>
-          </a:stretch>
-        </p:blipFill>
-        <p:spPr>
-          <a:xfrm>
-            <a:off x="4741929" y="1738149"/>
-            <a:ext cx="4775200" cy="4800600"/>
-          </a:xfrm>
-          <a:prstGeom prst="rect">
-            <a:avLst/>
-          </a:prstGeom>
-        </p:spPr>
-      </p:pic>
-    </p:spTree>
-    <p:extLst>
-      <p:ext uri="{BB962C8B-B14F-4D97-AF65-F5344CB8AC3E}">
-        <p14:creationId xmlns:p14="http://schemas.microsoft.com/office/powerpoint/2010/main" val="1586308401"/>
-      </p:ext>
-    </p:extLst>
-  </p:cSld>
-  <p:clrMapOvr>
-    <a:masterClrMapping/>
-  </p:clrMapOvr>
 </p:sld>
 </file>
 

</xml_diff>